<commit_message>
Update PPTX with WebUI. Export PPTX as well.
</commit_message>
<xml_diff>
--- a/Test Framework Midterm Presentation.pptx
+++ b/Test Framework Midterm Presentation.pptx
@@ -5987,10 +5987,9 @@
           <a:lstStyle/>
           <a:p>
             <a:r>
-              <a:rPr lang="en-US" dirty="0" smtClean="0"/>
+              <a:rPr lang="en-US" dirty="0"/>
               <a:t>Requirements (User and System Level)</a:t>
             </a:r>
-            <a:endParaRPr lang="en-US" dirty="0"/>
           </a:p>
         </p:txBody>
       </p:sp>
@@ -6017,29 +6016,17 @@
           <a:lstStyle/>
           <a:p>
             <a:r>
-              <a:rPr lang="en-US" dirty="0" smtClean="0"/>
-              <a:t>2.2  The </a:t>
-            </a:r>
-            <a:r>
-              <a:rPr lang="en-US" dirty="0"/>
-              <a:t>user shall have the ability to view the results of the test as each test completes. He/she shall also have the ability to view the log files where all results and relevant output are stored. The logs should contain various levels of information depending on the specified log level and shall display a time and date stamp</a:t>
-            </a:r>
-            <a:r>
-              <a:rPr lang="en-US" dirty="0" smtClean="0"/>
-              <a:t>.</a:t>
-            </a:r>
-          </a:p>
-          <a:p>
-            <a:endParaRPr lang="en-US" dirty="0" smtClean="0"/>
-          </a:p>
-          <a:p>
-            <a:r>
-              <a:rPr lang="en-US" dirty="0" smtClean="0"/>
-              <a:t>2.2.1</a:t>
-            </a:r>
-            <a:r>
-              <a:rPr lang="en-US" dirty="0"/>
-              <a:t>	The system shall display whether each test failed or succeeded. [0]</a:t>
+              <a:rPr lang="en-US" dirty="0"/>
+              <a:t>2.2  The user shall have the ability to view the results of the test as each test completes. He/she shall also have the ability to view the log files where all results and relevant output are stored. The logs should contain various levels of information depending on the specified log level and shall display a time and date stamp.</a:t>
+            </a:r>
+          </a:p>
+          <a:p>
+            <a:endParaRPr lang="en-US" dirty="0"/>
+          </a:p>
+          <a:p>
+            <a:r>
+              <a:rPr lang="en-US" dirty="0"/>
+              <a:t>2.2.1	The system shall display whether each test failed or succeeded. [0]</a:t>
             </a:r>
           </a:p>
           <a:p>
@@ -6058,41 +6045,21 @@
             <a:pPr lvl="1"/>
             <a:r>
               <a:rPr lang="en-US" dirty="0"/>
-              <a:t>2.2.3.1	</a:t>
-            </a:r>
-            <a:r>
-              <a:rPr lang="en-US" dirty="0" smtClean="0"/>
-              <a:t>  INFO </a:t>
-            </a:r>
-            <a:r>
-              <a:rPr lang="en-US" dirty="0"/>
-              <a:t>shall describe specific information for test pass/fail reporting.</a:t>
+              <a:t>2.2.3.1	  INFO shall describe specific information for test pass/fail reporting.</a:t>
             </a:r>
           </a:p>
           <a:p>
             <a:pPr lvl="1"/>
             <a:r>
-              <a:rPr lang="en-US" dirty="0" smtClean="0"/>
-              <a:t>2.2.3.2  DEBUG </a:t>
-            </a:r>
-            <a:r>
-              <a:rPr lang="en-US" dirty="0"/>
-              <a:t>shall describe information provided by the programmer/developer to aid in debugging the test.</a:t>
+              <a:rPr lang="en-US" dirty="0"/>
+              <a:t>2.2.3.2  DEBUG shall describe information provided by the programmer/developer to aid in debugging the test.</a:t>
             </a:r>
           </a:p>
           <a:p>
             <a:pPr lvl="1"/>
             <a:r>
               <a:rPr lang="en-US" dirty="0"/>
-              <a:t>2.2.3.3	</a:t>
-            </a:r>
-            <a:r>
-              <a:rPr lang="en-US" dirty="0" smtClean="0"/>
-              <a:t>  ERROR </a:t>
-            </a:r>
-            <a:r>
-              <a:rPr lang="en-US" dirty="0"/>
-              <a:t>shall describe the most detailed debugging output for examination of software test failures.</a:t>
+              <a:t>2.2.3.3	  ERROR shall describe the most detailed debugging output for examination of software test failures.</a:t>
             </a:r>
           </a:p>
           <a:p>
@@ -6147,7 +6114,7 @@
           <p:cNvPr id="2" name="Title 1">
             <a:extLst>
               <a:ext uri="{FF2B5EF4-FFF2-40B4-BE49-F238E27FC236}">
-                <a16:creationId xmlns="" xmlns:a16="http://schemas.microsoft.com/office/drawing/2014/main" id="{3016A5BA-F72A-4CD9-AF4C-68ADAC202004}"/>
+                <a16:creationId xmlns:a16="http://schemas.microsoft.com/office/drawing/2014/main" id="{3016A5BA-F72A-4CD9-AF4C-68ADAC202004}"/>
               </a:ext>
             </a:extLst>
           </p:cNvPr>
@@ -6164,10 +6131,9 @@
           <a:lstStyle/>
           <a:p>
             <a:r>
-              <a:rPr lang="en-US" dirty="0" smtClean="0"/>
+              <a:rPr lang="en-US" dirty="0"/>
               <a:t>Requirements (User and System Level)</a:t>
             </a:r>
-            <a:endParaRPr lang="en-US" dirty="0"/>
           </a:p>
         </p:txBody>
       </p:sp>
@@ -6176,7 +6142,7 @@
           <p:cNvPr id="3" name="Content Placeholder 2">
             <a:extLst>
               <a:ext uri="{FF2B5EF4-FFF2-40B4-BE49-F238E27FC236}">
-                <a16:creationId xmlns="" xmlns:a16="http://schemas.microsoft.com/office/drawing/2014/main" id="{BAC61804-0702-4E9C-9632-1F546949E17F}"/>
+                <a16:creationId xmlns:a16="http://schemas.microsoft.com/office/drawing/2014/main" id="{BAC61804-0702-4E9C-9632-1F546949E17F}"/>
               </a:ext>
             </a:extLst>
           </p:cNvPr>
@@ -6200,29 +6166,17 @@
           <a:lstStyle/>
           <a:p>
             <a:r>
-              <a:rPr lang="en-US" dirty="0" smtClean="0"/>
-              <a:t>2.3  Users </a:t>
-            </a:r>
-            <a:r>
-              <a:rPr lang="en-US" dirty="0"/>
-              <a:t>shall have the ability to provide a test case where several tests are sent in quick succession to demonstrate the application executes tests concurrently</a:t>
-            </a:r>
-            <a:r>
-              <a:rPr lang="en-US" dirty="0" smtClean="0"/>
-              <a:t>.</a:t>
-            </a:r>
-          </a:p>
-          <a:p>
-            <a:endParaRPr lang="en-US" dirty="0" smtClean="0"/>
-          </a:p>
-          <a:p>
-            <a:r>
-              <a:rPr lang="en-US" dirty="0" smtClean="0"/>
-              <a:t>2.3.1</a:t>
-            </a:r>
-            <a:r>
-              <a:rPr lang="en-US" dirty="0"/>
-              <a:t>	The test case shall consist of several tests of varying duration that can run simultaneously. [0]</a:t>
+              <a:rPr lang="en-US" dirty="0"/>
+              <a:t>2.3  Users shall have the ability to provide a test case where several tests are sent in quick succession to demonstrate the application executes tests concurrently.</a:t>
+            </a:r>
+          </a:p>
+          <a:p>
+            <a:endParaRPr lang="en-US" dirty="0"/>
+          </a:p>
+          <a:p>
+            <a:r>
+              <a:rPr lang="en-US" dirty="0"/>
+              <a:t>2.3.1	The test case shall consist of several tests of varying duration that can run simultaneously. [0]</a:t>
             </a:r>
           </a:p>
           <a:p>
@@ -6240,34 +6194,22 @@
           <a:p>
             <a:pPr lvl="1"/>
             <a:r>
-              <a:rPr lang="en-US" dirty="0" smtClean="0"/>
-              <a:t>2.3.3.1 The </a:t>
-            </a:r>
-            <a:r>
-              <a:rPr lang="en-US" dirty="0"/>
-              <a:t>system shall allow specification of the thread pool size. [1]</a:t>
+              <a:rPr lang="en-US" dirty="0"/>
+              <a:t>2.3.3.1 The system shall allow specification of the thread pool size. [1]</a:t>
             </a:r>
           </a:p>
           <a:p>
             <a:pPr lvl="1"/>
             <a:r>
-              <a:rPr lang="en-US" dirty="0" smtClean="0"/>
-              <a:t>2.3.3.2 The </a:t>
-            </a:r>
-            <a:r>
-              <a:rPr lang="en-US" dirty="0"/>
-              <a:t>starting default minimum thread count shall be 5. [1]</a:t>
+              <a:rPr lang="en-US" dirty="0"/>
+              <a:t>2.3.3.2 The starting default minimum thread count shall be 5. [1]</a:t>
             </a:r>
           </a:p>
           <a:p>
             <a:pPr lvl="1"/>
             <a:r>
-              <a:rPr lang="en-US" dirty="0" smtClean="0"/>
-              <a:t>2.3.3.3 The </a:t>
-            </a:r>
-            <a:r>
-              <a:rPr lang="en-US" dirty="0"/>
-              <a:t>starting default maximum thread count shall be 15 (this keeps the application from spawning too many threads). [1]</a:t>
+              <a:rPr lang="en-US" dirty="0"/>
+              <a:t>2.3.3.3 The starting default maximum thread count shall be 15 (this keeps the application from spawning too many threads). [1]</a:t>
             </a:r>
           </a:p>
         </p:txBody>
@@ -6318,10 +6260,9 @@
           <a:lstStyle/>
           <a:p>
             <a:r>
-              <a:rPr lang="en-US" dirty="0" smtClean="0"/>
+              <a:rPr lang="en-US" dirty="0"/>
               <a:t>Requirements (User and System Level)</a:t>
             </a:r>
-            <a:endParaRPr lang="en-US" dirty="0"/>
           </a:p>
         </p:txBody>
       </p:sp>
@@ -6348,12 +6289,8 @@
           <a:lstStyle/>
           <a:p>
             <a:r>
-              <a:rPr lang="en-US" dirty="0" smtClean="0"/>
-              <a:t>2.4  The </a:t>
-            </a:r>
-            <a:r>
-              <a:rPr lang="en-US" dirty="0"/>
-              <a:t>test engine shall run on Windows platform and should run on Linux and Mac platforms. User access to the system shall be provided through a Web User Interface (</a:t>
+              <a:rPr lang="en-US" dirty="0"/>
+              <a:t>2.4  The test engine shall run on Windows platform and should run on Linux and Mac platforms. User access to the system shall be provided through a Web User Interface (</a:t>
             </a:r>
             <a:r>
               <a:rPr lang="en-US" dirty="0" err="1"/>
@@ -6371,19 +6308,15 @@
               <a:rPr lang="en-US" dirty="0"/>
               <a:t> shall support the Firefox web browser and should support Google Chrome and Microsoft Edge.</a:t>
             </a:r>
-            <a:endParaRPr lang="en-US" b="1" dirty="0" smtClean="0"/>
-          </a:p>
-          <a:p>
-            <a:endParaRPr lang="en-US" dirty="0" smtClean="0"/>
-          </a:p>
-          <a:p>
-            <a:r>
-              <a:rPr lang="en-US" dirty="0" smtClean="0"/>
-              <a:t>2.4.1</a:t>
-            </a:r>
-            <a:r>
-              <a:rPr lang="en-US" dirty="0"/>
-              <a:t>	The test engine shall be an application that can run on the Windows platform. [0]</a:t>
+            <a:endParaRPr lang="en-US" b="1" dirty="0"/>
+          </a:p>
+          <a:p>
+            <a:endParaRPr lang="en-US" dirty="0"/>
+          </a:p>
+          <a:p>
+            <a:r>
+              <a:rPr lang="en-US" dirty="0"/>
+              <a:t>2.4.1	The test engine shall be an application that can run on the Windows platform. [0]</a:t>
             </a:r>
           </a:p>
           <a:p>
@@ -6403,37 +6336,21 @@
             </a:r>
             <a:r>
               <a:rPr lang="en-US" dirty="0"/>
-              <a:t> to be accessed via a standard web </a:t>
-            </a:r>
-            <a:r>
-              <a:rPr lang="en-US" dirty="0" smtClean="0"/>
-              <a:t>browser</a:t>
-            </a:r>
-            <a:r>
-              <a:rPr lang="en-US" dirty="0"/>
-              <a:t>. [1]</a:t>
+              <a:t> to be accessed via a standard web browser. [1]</a:t>
             </a:r>
           </a:p>
           <a:p>
             <a:pPr lvl="1"/>
             <a:r>
-              <a:rPr lang="en-US" dirty="0" smtClean="0"/>
-              <a:t>2.4.3.1  The </a:t>
-            </a:r>
-            <a:r>
-              <a:rPr lang="en-US" dirty="0"/>
-              <a:t>system shall support the Firefox web browser. [1]</a:t>
+              <a:rPr lang="en-US" dirty="0"/>
+              <a:t>2.4.3.1  The system shall support the Firefox web browser. [1]</a:t>
             </a:r>
           </a:p>
           <a:p>
             <a:pPr lvl="1"/>
             <a:r>
-              <a:rPr lang="en-US" dirty="0" smtClean="0"/>
-              <a:t>2.4.3.2  The </a:t>
-            </a:r>
-            <a:r>
-              <a:rPr lang="en-US" dirty="0"/>
-              <a:t>system should support the Microsoft Edge and Google Chrome web browsers. [2]</a:t>
+              <a:rPr lang="en-US" dirty="0"/>
+              <a:t>2.4.3.2  The system should support the Microsoft Edge and Google Chrome web browsers. [2]</a:t>
             </a:r>
           </a:p>
           <a:p>
@@ -6487,10 +6404,9 @@
           <a:lstStyle/>
           <a:p>
             <a:r>
-              <a:rPr lang="en-US" dirty="0" smtClean="0"/>
+              <a:rPr lang="en-US" dirty="0"/>
               <a:t>Requirements (User and System Level)</a:t>
             </a:r>
-            <a:endParaRPr lang="en-US" dirty="0"/>
           </a:p>
         </p:txBody>
       </p:sp>
@@ -6517,16 +6433,16 @@
           <a:lstStyle/>
           <a:p>
             <a:r>
-              <a:rPr lang="en-US" smtClean="0"/>
+              <a:rPr lang="en-US"/>
               <a:t>2.5  The system shall handle application failures and errors as well as test failures and errors.</a:t>
             </a:r>
           </a:p>
           <a:p>
-            <a:endParaRPr lang="en-US" smtClean="0"/>
-          </a:p>
-          <a:p>
-            <a:r>
-              <a:rPr lang="en-US" smtClean="0"/>
+            <a:endParaRPr lang="en-US"/>
+          </a:p>
+          <a:p>
+            <a:r>
+              <a:rPr lang="en-US"/>
               <a:t>2.5.1	The system shall handle exceptions thrown by the application during testing with clear user 	output. [0]</a:t>
             </a:r>
           </a:p>
@@ -6581,10 +6497,9 @@
           <a:lstStyle/>
           <a:p>
             <a:r>
-              <a:rPr lang="en-US" dirty="0" smtClean="0"/>
+              <a:rPr lang="en-US" dirty="0"/>
               <a:t>Requirements (User and System Level)</a:t>
             </a:r>
-            <a:endParaRPr lang="en-US" dirty="0"/>
           </a:p>
         </p:txBody>
       </p:sp>
@@ -6611,16 +6526,8 @@
           <a:lstStyle/>
           <a:p>
             <a:r>
-              <a:rPr lang="en-US" dirty="0" smtClean="0"/>
-              <a:t>2.6  The </a:t>
-            </a:r>
-            <a:r>
-              <a:rPr lang="en-US" dirty="0"/>
-              <a:t>system shall be user friendly, have a graphic user interface, and use a web-enabled client (browser). The system shall be installable locally on the user’s machine and use its own desktop interface</a:t>
-            </a:r>
-            <a:r>
-              <a:rPr lang="en-US" dirty="0" smtClean="0"/>
-              <a:t>.</a:t>
+              <a:rPr lang="en-US" dirty="0"/>
+              <a:t>2.6  The system shall be user friendly, have a graphic user interface, and use a web-enabled client (browser). The system shall be installable locally on the user’s machine and use its own desktop interface.</a:t>
             </a:r>
           </a:p>
           <a:p>
@@ -6669,64 +6576,36 @@
           <a:p>
             <a:pPr lvl="1"/>
             <a:r>
-              <a:rPr lang="en-US" dirty="0" smtClean="0"/>
-              <a:t>2.6.4.1  Display </a:t>
-            </a:r>
-            <a:r>
-              <a:rPr lang="en-US" dirty="0"/>
-              <a:t>all possible tests and allow the user to select all tests they wish to run. </a:t>
-            </a:r>
-            <a:r>
-              <a:rPr lang="en-US" dirty="0" smtClean="0"/>
-              <a:t>[</a:t>
-            </a:r>
-            <a:r>
-              <a:rPr lang="en-US" dirty="0"/>
-              <a:t>0]</a:t>
+              <a:rPr lang="en-US" dirty="0"/>
+              <a:t>2.6.4.1  Display all possible tests and allow the user to select all tests they wish to run. [0]</a:t>
             </a:r>
           </a:p>
           <a:p>
             <a:pPr lvl="1"/>
             <a:r>
-              <a:rPr lang="en-US" dirty="0" smtClean="0"/>
-              <a:t>2.6.4.2  Display </a:t>
-            </a:r>
-            <a:r>
-              <a:rPr lang="en-US" dirty="0"/>
-              <a:t>the selected list of all tests to be run (container object on GUI). [0]</a:t>
+              <a:rPr lang="en-US" dirty="0"/>
+              <a:t>2.6.4.2  Display the selected list of all tests to be run (container object on GUI). [0]</a:t>
             </a:r>
           </a:p>
           <a:p>
             <a:pPr lvl="1"/>
             <a:r>
-              <a:rPr lang="en-US" dirty="0" smtClean="0"/>
-              <a:t>2.6.4.3  Show </a:t>
-            </a:r>
-            <a:r>
-              <a:rPr lang="en-US" dirty="0"/>
-              <a:t>test progress and status on the GUI. [0]</a:t>
+              <a:rPr lang="en-US" dirty="0"/>
+              <a:t>2.6.4.3  Show test progress and status on the GUI. [0]</a:t>
             </a:r>
           </a:p>
           <a:p>
             <a:pPr lvl="1"/>
             <a:r>
-              <a:rPr lang="en-US" dirty="0" smtClean="0"/>
-              <a:t>2.6.4.4  Display </a:t>
-            </a:r>
-            <a:r>
-              <a:rPr lang="en-US" dirty="0"/>
-              <a:t>the results of each test in real-time. [1]</a:t>
+              <a:rPr lang="en-US" dirty="0"/>
+              <a:t>2.6.4.4  Display the results of each test in real-time. [1]</a:t>
             </a:r>
           </a:p>
           <a:p>
             <a:pPr lvl="1"/>
             <a:r>
-              <a:rPr lang="en-US" dirty="0" smtClean="0"/>
-              <a:t>2.6.4.5  Allow </a:t>
-            </a:r>
-            <a:r>
-              <a:rPr lang="en-US" dirty="0"/>
-              <a:t>the user to specify an output file in which to log the test results. [1]</a:t>
+              <a:rPr lang="en-US" dirty="0"/>
+              <a:t>2.6.4.5  Allow the user to specify an output file in which to log the test results. [1]</a:t>
             </a:r>
           </a:p>
         </p:txBody>
@@ -6782,25 +6661,16 @@
           <a:lstStyle/>
           <a:p>
             <a:r>
-              <a:rPr lang="en-US" dirty="0" smtClean="0"/>
-              <a:t>Requirements </a:t>
-            </a:r>
-            <a:r>
-              <a:rPr lang="en-US" dirty="0"/>
-              <a:t>(User and System Level</a:t>
-            </a:r>
-            <a:r>
-              <a:rPr lang="en-US" dirty="0" smtClean="0"/>
-              <a:t>)</a:t>
+              <a:rPr lang="en-US" dirty="0"/>
+              <a:t>Requirements (User and System Level)</a:t>
             </a:r>
             <a:br>
-              <a:rPr lang="en-US" dirty="0" smtClean="0"/>
+              <a:rPr lang="en-US" dirty="0"/>
             </a:br>
             <a:r>
-              <a:rPr lang="en-US" dirty="0" smtClean="0"/>
+              <a:rPr lang="en-US" dirty="0"/>
               <a:t>2.6 Continued</a:t>
             </a:r>
-            <a:endParaRPr lang="en-US" dirty="0"/>
           </a:p>
         </p:txBody>
       </p:sp>
@@ -6837,86 +6707,50 @@
           <a:p>
             <a:pPr lvl="1"/>
             <a:r>
-              <a:rPr lang="en-US" dirty="0" smtClean="0"/>
-              <a:t>2.6.5.1  Display </a:t>
-            </a:r>
-            <a:r>
-              <a:rPr lang="en-US" dirty="0"/>
-              <a:t>all possible tests and allow the user to select all tests they wish to run. </a:t>
-            </a:r>
-            <a:r>
-              <a:rPr lang="en-US" dirty="0" smtClean="0"/>
-              <a:t>[</a:t>
-            </a:r>
-            <a:r>
-              <a:rPr lang="en-US" dirty="0"/>
-              <a:t>1]</a:t>
+              <a:rPr lang="en-US" dirty="0"/>
+              <a:t>2.6.5.1  Display all possible tests and allow the user to select all tests they wish to run. [1]</a:t>
             </a:r>
           </a:p>
           <a:p>
             <a:pPr lvl="1"/>
             <a:r>
-              <a:rPr lang="en-US" dirty="0" smtClean="0"/>
-              <a:t>2.6.5.2  Display </a:t>
-            </a:r>
-            <a:r>
-              <a:rPr lang="en-US" dirty="0"/>
-              <a:t>the selected list of all tests to be run (container object on GUI). [1]</a:t>
+              <a:rPr lang="en-US" dirty="0"/>
+              <a:t>2.6.5.2  Display the selected list of all tests to be run (container object on GUI). [1]</a:t>
             </a:r>
           </a:p>
           <a:p>
             <a:pPr lvl="1"/>
             <a:r>
-              <a:rPr lang="en-US" dirty="0" smtClean="0"/>
-              <a:t>2.6.5.3  Show </a:t>
-            </a:r>
-            <a:r>
-              <a:rPr lang="en-US" dirty="0"/>
-              <a:t>test progress and status on the GUI. [1]</a:t>
+              <a:rPr lang="en-US" dirty="0"/>
+              <a:t>2.6.5.3  Show test progress and status on the GUI. [1]</a:t>
             </a:r>
           </a:p>
           <a:p>
             <a:pPr lvl="1"/>
             <a:r>
-              <a:rPr lang="en-US" dirty="0" smtClean="0"/>
-              <a:t>2.6.5.4  Display </a:t>
-            </a:r>
-            <a:r>
-              <a:rPr lang="en-US" dirty="0"/>
-              <a:t>the results of each test in real-time. [2]</a:t>
+              <a:rPr lang="en-US" dirty="0"/>
+              <a:t>2.6.5.4  Display the results of each test in real-time. [2]</a:t>
             </a:r>
           </a:p>
           <a:p>
             <a:pPr lvl="1"/>
             <a:r>
-              <a:rPr lang="en-US" dirty="0" smtClean="0"/>
-              <a:t>2.6.5.5  Allow </a:t>
-            </a:r>
-            <a:r>
-              <a:rPr lang="en-US" dirty="0"/>
-              <a:t>the user to specify an output file in which to log the test results. [2]</a:t>
+              <a:rPr lang="en-US" dirty="0"/>
+              <a:t>2.6.5.5  Allow the user to specify an output file in which to log the test results. [2]</a:t>
             </a:r>
           </a:p>
           <a:p>
             <a:pPr lvl="1"/>
             <a:r>
-              <a:rPr lang="en-US" dirty="0" smtClean="0"/>
-              <a:t>2.6.5.6  </a:t>
-            </a:r>
-            <a:r>
-              <a:rPr lang="en-US" dirty="0"/>
-              <a:t>Execute tests on available clients. [1]</a:t>
+              <a:rPr lang="en-US" dirty="0"/>
+              <a:t>2.6.5.6  Execute tests on available clients. [1]</a:t>
             </a:r>
           </a:p>
           <a:p>
             <a:pPr lvl="1"/>
             <a:r>
-              <a:rPr lang="en-US" dirty="0" smtClean="0"/>
-              <a:t>2.6.5.7  </a:t>
-            </a:r>
-            <a:r>
-              <a:rPr lang="en-US" dirty="0"/>
-              <a:t>Export current and prior test results for specific clients. [2]</a:t>
+              <a:rPr lang="en-US" dirty="0"/>
+              <a:t>2.6.5.7  Export current and prior test results for specific clients. [2]</a:t>
             </a:r>
           </a:p>
           <a:p>
@@ -6970,10 +6804,9 @@
           <a:lstStyle/>
           <a:p>
             <a:r>
-              <a:rPr lang="en-US" dirty="0" smtClean="0"/>
+              <a:rPr lang="en-US" dirty="0"/>
               <a:t>Requirements (User and System Level)</a:t>
             </a:r>
-            <a:endParaRPr lang="en-US" dirty="0"/>
           </a:p>
         </p:txBody>
       </p:sp>
@@ -7000,12 +6833,8 @@
           <a:lstStyle/>
           <a:p>
             <a:r>
-              <a:rPr lang="en-US" dirty="0" smtClean="0"/>
-              <a:t>2.7  The </a:t>
-            </a:r>
-            <a:r>
-              <a:rPr lang="en-US" dirty="0"/>
-              <a:t>user shall log into the system via the </a:t>
+              <a:rPr lang="en-US" dirty="0"/>
+              <a:t>2.7  The user shall log into the system via the </a:t>
             </a:r>
             <a:r>
               <a:rPr lang="en-US" dirty="0" err="1"/>
@@ -7013,11 +6842,7 @@
             </a:r>
             <a:r>
               <a:rPr lang="en-US" dirty="0"/>
-              <a:t> and the system will authenticate the user.  Once logged into the system and user role determination has been made, the user can register/de-register his/her machine with the Test Server</a:t>
-            </a:r>
-            <a:r>
-              <a:rPr lang="en-US" dirty="0" smtClean="0"/>
-              <a:t>.</a:t>
+              <a:t> and the system will authenticate the user.  Once logged into the system and user role determination has been made, the user can register/de-register his/her machine with the Test Server.</a:t>
             </a:r>
           </a:p>
           <a:p>
@@ -7049,7 +6874,6 @@
               <a:rPr lang="en-US" dirty="0"/>
               <a:t>2.7.4	The user shall have the ability to de-register their local test engine with the test server. [1]</a:t>
             </a:r>
-            <a:endParaRPr lang="en-US" dirty="0"/>
           </a:p>
         </p:txBody>
       </p:sp>
@@ -7099,10 +6923,9 @@
           <a:lstStyle/>
           <a:p>
             <a:r>
-              <a:rPr lang="en-US" dirty="0" smtClean="0"/>
+              <a:rPr lang="en-US" dirty="0"/>
               <a:t>Requirements (User and System Level)</a:t>
             </a:r>
-            <a:endParaRPr lang="en-US" dirty="0"/>
           </a:p>
         </p:txBody>
       </p:sp>
@@ -7129,20 +6952,8 @@
           <a:lstStyle/>
           <a:p>
             <a:r>
-              <a:rPr lang="en-US" dirty="0" smtClean="0"/>
-              <a:t>2.8  </a:t>
-            </a:r>
-            <a:r>
-              <a:rPr lang="en-US" dirty="0" smtClean="0"/>
-              <a:t>The </a:t>
-            </a:r>
-            <a:r>
-              <a:rPr lang="en-US" dirty="0"/>
-              <a:t>system shall be highly available and disaster recoverable. The system will have a production environment that is usable by multiple users implemented in multiple regions and availability zones in the cloud. [2</a:t>
-            </a:r>
-            <a:r>
-              <a:rPr lang="en-US" dirty="0" smtClean="0"/>
-              <a:t>]</a:t>
+              <a:rPr lang="en-US" dirty="0"/>
+              <a:t>2.8  The system shall be highly available and disaster recoverable. The system will have a production environment that is usable by multiple users implemented in multiple regions and availability zones in the cloud. [2]</a:t>
             </a:r>
           </a:p>
           <a:p>
@@ -7153,90 +6964,38 @@
           </a:p>
           <a:p>
             <a:r>
-              <a:rPr lang="en-US" dirty="0" smtClean="0"/>
-              <a:t>2.8.1</a:t>
-            </a:r>
-            <a:r>
-              <a:rPr lang="en-US" dirty="0"/>
-              <a:t>	The user shall have the ability to install the test engine on multiple machines (redundancy, performance, latency). [0]</a:t>
-            </a:r>
-          </a:p>
-          <a:p>
-            <a:r>
-              <a:rPr lang="en-US" dirty="0" smtClean="0"/>
-              <a:t>2.8.2   </a:t>
-            </a:r>
-            <a:r>
-              <a:rPr lang="en-US" dirty="0" smtClean="0"/>
-              <a:t>The </a:t>
-            </a:r>
-            <a:r>
-              <a:rPr lang="en-US" dirty="0"/>
-              <a:t>system shall maintain all program code in scripts that can be deployed to the cloud platform. 	System source code and data shall be stored in a fault-tolerant, distributed file system such as 	Amazon S3 or HDFS where it can be accessible and deployed to support disaster recovery and 	availability requirements. [2]</a:t>
-            </a:r>
-          </a:p>
-          <a:p>
-            <a:r>
-              <a:rPr lang="en-US" dirty="0" smtClean="0"/>
-              <a:t>2.8.3   </a:t>
-            </a:r>
-            <a:r>
-              <a:rPr lang="en-US" dirty="0" smtClean="0"/>
-              <a:t>Backup </a:t>
-            </a:r>
-            <a:r>
-              <a:rPr lang="en-US" dirty="0"/>
-              <a:t>copies of all scripts shall be located in a separate region. [2]</a:t>
-            </a:r>
-          </a:p>
-          <a:p>
-            <a:r>
-              <a:rPr lang="en-US" dirty="0" smtClean="0"/>
-              <a:t>2.8.4   </a:t>
-            </a:r>
-            <a:r>
-              <a:rPr lang="en-US" dirty="0" smtClean="0"/>
-              <a:t>System </a:t>
-            </a:r>
-            <a:r>
-              <a:rPr lang="en-US" dirty="0"/>
-              <a:t>source code shall be deployed to cloud instances hosted in several regions and availability zones. [2]</a:t>
-            </a:r>
-          </a:p>
-          <a:p>
-            <a:r>
-              <a:rPr lang="en-US" dirty="0" smtClean="0"/>
-              <a:t>2.8.5</a:t>
-            </a:r>
-            <a:r>
-              <a:rPr lang="en-US" dirty="0"/>
-              <a:t>	</a:t>
-            </a:r>
-            <a:r>
-              <a:rPr lang="en-US" dirty="0" smtClean="0"/>
-              <a:t> Access </a:t>
-            </a:r>
-            <a:r>
-              <a:rPr lang="en-US" dirty="0"/>
-              <a:t>to the system shall be controlled using defined, cloud managed IAM roles, which will allow for configurable levels of access to and control over the system and its resources. [1]</a:t>
-            </a:r>
-          </a:p>
-          <a:p>
-            <a:r>
-              <a:rPr lang="en-US" dirty="0" smtClean="0"/>
-              <a:t>2.8.6</a:t>
-            </a:r>
-            <a:r>
-              <a:rPr lang="en-US" dirty="0"/>
-              <a:t>	</a:t>
-            </a:r>
-            <a:r>
-              <a:rPr lang="en-US" dirty="0" smtClean="0"/>
-              <a:t> The </a:t>
-            </a:r>
-            <a:r>
-              <a:rPr lang="en-US" dirty="0"/>
-              <a:t>test environment shall be implemented in multiple zones and multiple regions to enable testing of HA/DR requirements rather than taking production down. [3]</a:t>
+              <a:rPr lang="en-US" dirty="0"/>
+              <a:t>2.8.1	The user shall have the ability to install the test engine on multiple machines (redundancy, performance, latency). [0]</a:t>
+            </a:r>
+          </a:p>
+          <a:p>
+            <a:r>
+              <a:rPr lang="en-US" dirty="0"/>
+              <a:t>2.8.2   The system shall maintain all program code in scripts that can be deployed to the cloud platform. 	System source code and data shall be stored in a fault-tolerant, distributed file system such as 	Amazon S3 or HDFS where it can be accessible and deployed to support disaster recovery and 	availability requirements. [2]</a:t>
+            </a:r>
+          </a:p>
+          <a:p>
+            <a:r>
+              <a:rPr lang="en-US" dirty="0"/>
+              <a:t>2.8.3   Backup copies of all scripts shall be located in a separate region. [2]</a:t>
+            </a:r>
+          </a:p>
+          <a:p>
+            <a:r>
+              <a:rPr lang="en-US" dirty="0"/>
+              <a:t>2.8.4   System source code shall be deployed to cloud instances hosted in several regions and availability zones. [2]</a:t>
+            </a:r>
+          </a:p>
+          <a:p>
+            <a:r>
+              <a:rPr lang="en-US" dirty="0"/>
+              <a:t>2.8.5	 Access to the system shall be controlled using defined, cloud managed IAM roles, which will allow for configurable levels of access to and control over the system and its resources. [1]</a:t>
+            </a:r>
+          </a:p>
+          <a:p>
+            <a:r>
+              <a:rPr lang="en-US" dirty="0"/>
+              <a:t>2.8.6	 The test environment shall be implemented in multiple zones and multiple regions to enable testing of HA/DR requirements rather than taking production down. [3]</a:t>
             </a:r>
           </a:p>
         </p:txBody>
@@ -7430,32 +7189,20 @@
           <a:lstStyle/>
           <a:p>
             <a:r>
-              <a:rPr lang="en-US" sz="2000" dirty="0" smtClean="0"/>
-              <a:t>4.1.1</a:t>
-            </a:r>
-            <a:r>
               <a:rPr lang="en-US" sz="2000" dirty="0"/>
-              <a:t>	The system shall be developed using the C++ programming language and the C++ Standard Template Library (STL). [0]</a:t>
-            </a:r>
-          </a:p>
-          <a:p>
-            <a:r>
-              <a:rPr lang="en-US" sz="2000" dirty="0" smtClean="0"/>
-              <a:t>4.1.2</a:t>
-            </a:r>
+              <a:t>4.1.1	The system shall be developed using the C++ programming language and the C++ Standard Template Library (STL). [0]</a:t>
+            </a:r>
+          </a:p>
+          <a:p>
             <a:r>
               <a:rPr lang="en-US" sz="2000" dirty="0"/>
-              <a:t>	The system shall be developed using a publicly available source code editor which supports the C++ language. [0]</a:t>
-            </a:r>
-          </a:p>
-          <a:p>
-            <a:r>
-              <a:rPr lang="en-US" sz="2000" dirty="0" smtClean="0"/>
-              <a:t>4.1.3    </a:t>
-            </a:r>
+              <a:t>4.1.2	The system shall be developed using a publicly available source code editor which supports the C++ language. [0]</a:t>
+            </a:r>
+          </a:p>
+          <a:p>
             <a:r>
               <a:rPr lang="en-US" sz="2000" dirty="0"/>
-              <a:t>The system shall have at least 75% unit test coverage of the source code. [1]</a:t>
+              <a:t>4.1.3    The system shall have at least 75% unit test coverage of the source code. [1]</a:t>
             </a:r>
           </a:p>
         </p:txBody>
@@ -7646,22 +7393,14 @@
           <a:lstStyle/>
           <a:p>
             <a:r>
-              <a:rPr lang="en-US" sz="2000" dirty="0" smtClean="0"/>
-              <a:t>4.2.1     </a:t>
-            </a:r>
-            <a:r>
               <a:rPr lang="en-US" sz="2000" dirty="0"/>
-              <a:t>Granting access to a new user of the system shall take no more than 1 business day to complete. [0]</a:t>
-            </a:r>
-          </a:p>
-          <a:p>
-            <a:r>
-              <a:rPr lang="en-US" sz="2000" dirty="0" smtClean="0"/>
-              <a:t>4.2.2     </a:t>
-            </a:r>
+              <a:t>4.2.1     Granting access to a new user of the system shall take no more than 1 business day to complete. [0]</a:t>
+            </a:r>
+          </a:p>
+          <a:p>
             <a:r>
               <a:rPr lang="en-US" sz="2000" dirty="0"/>
-              <a:t>Modifying or removing a user’s access to the system shall take no more than 1 business day to complete. [0]</a:t>
+              <a:t>4.2.2     Modifying or removing a user’s access to the system shall take no more than 1 business day to complete. [0]</a:t>
             </a:r>
           </a:p>
         </p:txBody>
@@ -7739,22 +7478,14 @@
           <a:lstStyle/>
           <a:p>
             <a:r>
-              <a:rPr lang="en-US" sz="2000" dirty="0" smtClean="0"/>
-              <a:t>4.3.1</a:t>
-            </a:r>
-            <a:r>
               <a:rPr lang="en-US" sz="2000" dirty="0"/>
-              <a:t>	Disaster recovery shall be cost-effective and managed through the fault tolerance and high availability features of the cloud-based system architecture. [1]</a:t>
-            </a:r>
-          </a:p>
-          <a:p>
-            <a:r>
-              <a:rPr lang="en-US" sz="2000" dirty="0" smtClean="0"/>
-              <a:t>4.3.2      </a:t>
-            </a:r>
+              <a:t>4.3.1	Disaster recovery shall be cost-effective and managed through the fault tolerance and high availability features of the cloud-based system architecture. [1]</a:t>
+            </a:r>
+          </a:p>
+          <a:p>
             <a:r>
               <a:rPr lang="en-US" sz="2000" dirty="0"/>
-              <a:t>User training shall take no more than 1 business day to complete, regardless of the user’s role. [2]</a:t>
+              <a:t>4.3.2      User training shall take no more than 1 business day to complete, regardless of the user’s role. [2]</a:t>
             </a:r>
           </a:p>
           <a:p>
@@ -7819,7 +7550,7 @@
           <p:cNvPr id="4" name="Picture 3">
             <a:extLst>
               <a:ext uri="{FF2B5EF4-FFF2-40B4-BE49-F238E27FC236}">
-                <a16:creationId xmlns="" xmlns:a16="http://schemas.microsoft.com/office/drawing/2014/main" id="{FA00AEF5-55CF-4716-B10D-11660D42C9F5}"/>
+                <a16:creationId xmlns:a16="http://schemas.microsoft.com/office/drawing/2014/main" id="{FA00AEF5-55CF-4716-B10D-11660D42C9F5}"/>
               </a:ext>
             </a:extLst>
           </p:cNvPr>
@@ -7849,7 +7580,7 @@
           <p:cNvPr id="6" name="Picture 5">
             <a:extLst>
               <a:ext uri="{FF2B5EF4-FFF2-40B4-BE49-F238E27FC236}">
-                <a16:creationId xmlns="" xmlns:a16="http://schemas.microsoft.com/office/drawing/2014/main" id="{2CE94564-7E21-42B5-B0C3-7B175B692FB4}"/>
+                <a16:creationId xmlns:a16="http://schemas.microsoft.com/office/drawing/2014/main" id="{2CE94564-7E21-42B5-B0C3-7B175B692FB4}"/>
               </a:ext>
             </a:extLst>
           </p:cNvPr>
@@ -7879,7 +7610,7 @@
           <p:cNvPr id="8" name="Picture 7">
             <a:extLst>
               <a:ext uri="{FF2B5EF4-FFF2-40B4-BE49-F238E27FC236}">
-                <a16:creationId xmlns="" xmlns:a16="http://schemas.microsoft.com/office/drawing/2014/main" id="{9A5C1814-5B60-480F-9900-D25FA371C13D}"/>
+                <a16:creationId xmlns:a16="http://schemas.microsoft.com/office/drawing/2014/main" id="{9A5C1814-5B60-480F-9900-D25FA371C13D}"/>
               </a:ext>
             </a:extLst>
           </p:cNvPr>
@@ -7961,7 +7692,7 @@
           <p:cNvPr id="5" name="Picture 4">
             <a:extLst>
               <a:ext uri="{FF2B5EF4-FFF2-40B4-BE49-F238E27FC236}">
-                <a16:creationId xmlns="" xmlns:a16="http://schemas.microsoft.com/office/drawing/2014/main" id="{13B04C9D-E45A-4DE2-AF80-B1367C691FAE}"/>
+                <a16:creationId xmlns:a16="http://schemas.microsoft.com/office/drawing/2014/main" id="{13B04C9D-E45A-4DE2-AF80-B1367C691FAE}"/>
               </a:ext>
             </a:extLst>
           </p:cNvPr>
@@ -8040,10 +7771,10 @@
       </p:sp>
       <p:pic>
         <p:nvPicPr>
-          <p:cNvPr id="9" name="Picture 8">
+          <p:cNvPr id="5" name="Picture 4">
             <a:extLst>
               <a:ext uri="{FF2B5EF4-FFF2-40B4-BE49-F238E27FC236}">
-                <a16:creationId xmlns="" xmlns:a16="http://schemas.microsoft.com/office/drawing/2014/main" id="{B50AD3E8-FD4C-4543-9C8F-D6BCED40866F}"/>
+                <a16:creationId xmlns:a16="http://schemas.microsoft.com/office/drawing/2014/main" id="{FB298827-6BC9-41F1-BAFC-D3F294B5FBED}"/>
               </a:ext>
             </a:extLst>
           </p:cNvPr>
@@ -8060,38 +7791,8 @@
         </p:blipFill>
         <p:spPr>
           <a:xfrm>
-            <a:off x="888886" y="1422398"/>
-            <a:ext cx="6076894" cy="5036705"/>
-          </a:xfrm>
-          <a:prstGeom prst="rect">
-            <a:avLst/>
-          </a:prstGeom>
-        </p:spPr>
-      </p:pic>
-      <p:pic>
-        <p:nvPicPr>
-          <p:cNvPr id="4" name="Picture 3">
-            <a:extLst>
-              <a:ext uri="{FF2B5EF4-FFF2-40B4-BE49-F238E27FC236}">
-                <a16:creationId xmlns="" xmlns:a16="http://schemas.microsoft.com/office/drawing/2014/main" id="{79E925FD-1F10-4036-9F0A-7FC0A5C14A78}"/>
-              </a:ext>
-            </a:extLst>
-          </p:cNvPr>
-          <p:cNvPicPr>
-            <a:picLocks noChangeAspect="1"/>
-          </p:cNvPicPr>
-          <p:nvPr/>
-        </p:nvPicPr>
-        <p:blipFill>
-          <a:blip r:embed="rId3"/>
-          <a:stretch>
-            <a:fillRect/>
-          </a:stretch>
-        </p:blipFill>
-        <p:spPr>
-          <a:xfrm>
-            <a:off x="6499020" y="1485903"/>
-            <a:ext cx="2385335" cy="3441698"/>
+            <a:off x="850108" y="1288474"/>
+            <a:ext cx="7587309" cy="5373417"/>
           </a:xfrm>
           <a:prstGeom prst="rect">
             <a:avLst/>
@@ -8650,7 +8351,7 @@
           <p:cNvPr id="6" name="Picture 5">
             <a:extLst>
               <a:ext uri="{FF2B5EF4-FFF2-40B4-BE49-F238E27FC236}">
-                <a16:creationId xmlns="" xmlns:a16="http://schemas.microsoft.com/office/drawing/2014/main" id="{42F62902-0B99-45F6-8313-405C7CFCB586}"/>
+                <a16:creationId xmlns:a16="http://schemas.microsoft.com/office/drawing/2014/main" id="{42F62902-0B99-45F6-8313-405C7CFCB586}"/>
               </a:ext>
             </a:extLst>
           </p:cNvPr>
@@ -9279,10 +8980,9 @@
           <a:lstStyle/>
           <a:p>
             <a:r>
-              <a:rPr lang="en-US" dirty="0" smtClean="0"/>
+              <a:rPr lang="en-US" dirty="0"/>
               <a:t>Requirements (User and System Level)</a:t>
             </a:r>
-            <a:endParaRPr lang="en-US" dirty="0"/>
           </a:p>
         </p:txBody>
       </p:sp>
@@ -9309,56 +9009,23 @@
           <a:lstStyle/>
           <a:p>
             <a:r>
-              <a:rPr lang="en-US" dirty="0" smtClean="0"/>
-              <a:t>2.1  The </a:t>
-            </a:r>
-            <a:r>
-              <a:rPr lang="en-US" dirty="0"/>
-              <a:t>users of this Test Framework system shall have the ability to setup and run individual unit tests of program code, hardware, and infrastructure, as well as run multiple tests simultaneously. They need to be able to stress performance, ensure scalability, and diagnose system interface issues.  Test results shall be saved for future recall, and configuration of the system maintained and stored</a:t>
-            </a:r>
-            <a:r>
-              <a:rPr lang="en-US" dirty="0" smtClean="0"/>
-              <a:t>.</a:t>
-            </a:r>
-          </a:p>
-          <a:p>
-            <a:endParaRPr lang="en-US" dirty="0" smtClean="0"/>
-          </a:p>
-          <a:p>
-            <a:r>
-              <a:rPr lang="en-US" dirty="0" smtClean="0"/>
-              <a:t>2.1.1 	The </a:t>
-            </a:r>
-            <a:r>
-              <a:rPr lang="en-US" dirty="0"/>
-              <a:t>test engine shall not require changing and recompiling the program each time a test is run. </a:t>
-            </a:r>
-            <a:r>
-              <a:rPr lang="en-US" dirty="0" smtClean="0"/>
-              <a:t>[</a:t>
-            </a:r>
-            <a:r>
-              <a:rPr lang="en-US" dirty="0"/>
-              <a:t>0]</a:t>
-            </a:r>
-            <a:endParaRPr lang="en-US" dirty="0" smtClean="0"/>
-          </a:p>
-          <a:p>
-            <a:r>
-              <a:rPr lang="en-US" dirty="0" smtClean="0"/>
-              <a:t>2.1.2</a:t>
-            </a:r>
-            <a:r>
-              <a:rPr lang="en-US" dirty="0"/>
-              <a:t>	</a:t>
-            </a:r>
-            <a:r>
-              <a:rPr lang="en-US" dirty="0" smtClean="0"/>
-              <a:t>The </a:t>
-            </a:r>
-            <a:r>
-              <a:rPr lang="en-US" dirty="0"/>
-              <a:t>system shall be implemented as a client-server system wherein the Web User Interface (</a:t>
+              <a:rPr lang="en-US" dirty="0"/>
+              <a:t>2.1  The users of this Test Framework system shall have the ability to setup and run individual unit tests of program code, hardware, and infrastructure, as well as run multiple tests simultaneously. They need to be able to stress performance, ensure scalability, and diagnose system interface issues.  Test results shall be saved for future recall, and configuration of the system maintained and stored.</a:t>
+            </a:r>
+          </a:p>
+          <a:p>
+            <a:endParaRPr lang="en-US" dirty="0"/>
+          </a:p>
+          <a:p>
+            <a:r>
+              <a:rPr lang="en-US" dirty="0"/>
+              <a:t>2.1.1 	The test engine shall not require changing and recompiling the program each time a test is run. [0]</a:t>
+            </a:r>
+          </a:p>
+          <a:p>
+            <a:r>
+              <a:rPr lang="en-US" dirty="0"/>
+              <a:t>2.1.2	The system shall be implemented as a client-server system wherein the Web User Interface (</a:t>
             </a:r>
             <a:r>
               <a:rPr lang="en-US" dirty="0" err="1"/>
@@ -9371,30 +9038,14 @@
           </a:p>
           <a:p>
             <a:r>
-              <a:rPr lang="en-US" dirty="0" smtClean="0"/>
-              <a:t>2.1.3</a:t>
-            </a:r>
-            <a:r>
-              <a:rPr lang="en-US" dirty="0"/>
-              <a:t>	</a:t>
-            </a:r>
-            <a:r>
-              <a:rPr lang="en-US" dirty="0" smtClean="0"/>
-              <a:t>The </a:t>
-            </a:r>
-            <a:r>
-              <a:rPr lang="en-US" dirty="0"/>
-              <a:t>system shall employ a database in which to store all test data, including configuration data, 	test cases, and test results. [1]</a:t>
-            </a:r>
-          </a:p>
-          <a:p>
-            <a:r>
-              <a:rPr lang="en-US" dirty="0" smtClean="0"/>
-              <a:t>2.2.4</a:t>
-            </a:r>
-            <a:r>
-              <a:rPr lang="en-US" dirty="0"/>
-              <a:t>	The system shall employ a test server, which will provide the business logic and serve as the API between the database and the </a:t>
+              <a:rPr lang="en-US" dirty="0"/>
+              <a:t>2.1.3	The system shall employ a database in which to store all test data, including configuration data, 	test cases, and test results. [1]</a:t>
+            </a:r>
+          </a:p>
+          <a:p>
+            <a:r>
+              <a:rPr lang="en-US" dirty="0"/>
+              <a:t>2.2.4	The system shall employ a test server, which will provide the business logic and serve as the API between the database and the </a:t>
             </a:r>
             <a:r>
               <a:rPr lang="en-US" dirty="0" err="1"/>
@@ -9407,22 +9058,14 @@
           </a:p>
           <a:p>
             <a:r>
-              <a:rPr lang="en-US" dirty="0" smtClean="0"/>
-              <a:t>2.1.5</a:t>
-            </a:r>
-            <a:r>
-              <a:rPr lang="en-US" dirty="0"/>
-              <a:t>	The system shall be hosted on a cloud platform to support ease of resource acquisition and hosting, automatic scaling of system resources, built-in network infrastructure, managed services	where needed. [2]</a:t>
-            </a:r>
-          </a:p>
-          <a:p>
-            <a:r>
-              <a:rPr lang="en-US" dirty="0" smtClean="0"/>
-              <a:t>2.1.6</a:t>
-            </a:r>
-            <a:r>
-              <a:rPr lang="en-US" dirty="0"/>
-              <a:t>	The system shall allow the ability to create additional environments for specialized testing upon demand. [2]</a:t>
+              <a:rPr lang="en-US" dirty="0"/>
+              <a:t>2.1.5	The system shall be hosted on a cloud platform to support ease of resource acquisition and hosting, automatic scaling of system resources, built-in network infrastructure, managed services	where needed. [2]</a:t>
+            </a:r>
+          </a:p>
+          <a:p>
+            <a:r>
+              <a:rPr lang="en-US" dirty="0"/>
+              <a:t>2.1.6	The system shall allow the ability to create additional environments for specialized testing upon demand. [2]</a:t>
             </a:r>
           </a:p>
           <a:p>

</xml_diff>

<commit_message>
Revert "Merge branch 'master' of https://github.com/KodeFu/cse682"
This reverts commit 91c7f83afcdb36baddad877fcfd4d338148967dd, reversing
changes made to 431ecfea1a67b3a1ed3dde7dcf4dd59c121e7c8c.
</commit_message>
<xml_diff>
--- a/Test Framework Midterm Presentation.pptx
+++ b/Test Framework Midterm Presentation.pptx
@@ -5987,9 +5987,10 @@
           <a:lstStyle/>
           <a:p>
             <a:r>
-              <a:rPr lang="en-US" dirty="0"/>
+              <a:rPr lang="en-US" dirty="0" smtClean="0"/>
               <a:t>Requirements (User and System Level)</a:t>
             </a:r>
+            <a:endParaRPr lang="en-US" dirty="0"/>
           </a:p>
         </p:txBody>
       </p:sp>
@@ -6016,17 +6017,29 @@
           <a:lstStyle/>
           <a:p>
             <a:r>
-              <a:rPr lang="en-US" dirty="0"/>
-              <a:t>2.2  The user shall have the ability to view the results of the test as each test completes. He/she shall also have the ability to view the log files where all results and relevant output are stored. The logs should contain various levels of information depending on the specified log level and shall display a time and date stamp.</a:t>
-            </a:r>
-          </a:p>
-          <a:p>
-            <a:endParaRPr lang="en-US" dirty="0"/>
-          </a:p>
-          <a:p>
-            <a:r>
-              <a:rPr lang="en-US" dirty="0"/>
-              <a:t>2.2.1	The system shall display whether each test failed or succeeded. [0]</a:t>
+              <a:rPr lang="en-US" dirty="0" smtClean="0"/>
+              <a:t>2.2  The </a:t>
+            </a:r>
+            <a:r>
+              <a:rPr lang="en-US" dirty="0"/>
+              <a:t>user shall have the ability to view the results of the test as each test completes. He/she shall also have the ability to view the log files where all results and relevant output are stored. The logs should contain various levels of information depending on the specified log level and shall display a time and date stamp</a:t>
+            </a:r>
+            <a:r>
+              <a:rPr lang="en-US" dirty="0" smtClean="0"/>
+              <a:t>.</a:t>
+            </a:r>
+          </a:p>
+          <a:p>
+            <a:endParaRPr lang="en-US" dirty="0" smtClean="0"/>
+          </a:p>
+          <a:p>
+            <a:r>
+              <a:rPr lang="en-US" dirty="0" smtClean="0"/>
+              <a:t>2.2.1</a:t>
+            </a:r>
+            <a:r>
+              <a:rPr lang="en-US" dirty="0"/>
+              <a:t>	The system shall display whether each test failed or succeeded. [0]</a:t>
             </a:r>
           </a:p>
           <a:p>
@@ -6045,21 +6058,41 @@
             <a:pPr lvl="1"/>
             <a:r>
               <a:rPr lang="en-US" dirty="0"/>
-              <a:t>2.2.3.1	  INFO shall describe specific information for test pass/fail reporting.</a:t>
+              <a:t>2.2.3.1	</a:t>
+            </a:r>
+            <a:r>
+              <a:rPr lang="en-US" dirty="0" smtClean="0"/>
+              <a:t>  INFO </a:t>
+            </a:r>
+            <a:r>
+              <a:rPr lang="en-US" dirty="0"/>
+              <a:t>shall describe specific information for test pass/fail reporting.</a:t>
             </a:r>
           </a:p>
           <a:p>
             <a:pPr lvl="1"/>
             <a:r>
-              <a:rPr lang="en-US" dirty="0"/>
-              <a:t>2.2.3.2  DEBUG shall describe information provided by the programmer/developer to aid in debugging the test.</a:t>
+              <a:rPr lang="en-US" dirty="0" smtClean="0"/>
+              <a:t>2.2.3.2  DEBUG </a:t>
+            </a:r>
+            <a:r>
+              <a:rPr lang="en-US" dirty="0"/>
+              <a:t>shall describe information provided by the programmer/developer to aid in debugging the test.</a:t>
             </a:r>
           </a:p>
           <a:p>
             <a:pPr lvl="1"/>
             <a:r>
               <a:rPr lang="en-US" dirty="0"/>
-              <a:t>2.2.3.3	  ERROR shall describe the most detailed debugging output for examination of software test failures.</a:t>
+              <a:t>2.2.3.3	</a:t>
+            </a:r>
+            <a:r>
+              <a:rPr lang="en-US" dirty="0" smtClean="0"/>
+              <a:t>  ERROR </a:t>
+            </a:r>
+            <a:r>
+              <a:rPr lang="en-US" dirty="0"/>
+              <a:t>shall describe the most detailed debugging output for examination of software test failures.</a:t>
             </a:r>
           </a:p>
           <a:p>
@@ -6114,7 +6147,7 @@
           <p:cNvPr id="2" name="Title 1">
             <a:extLst>
               <a:ext uri="{FF2B5EF4-FFF2-40B4-BE49-F238E27FC236}">
-                <a16:creationId xmlns:a16="http://schemas.microsoft.com/office/drawing/2014/main" id="{3016A5BA-F72A-4CD9-AF4C-68ADAC202004}"/>
+                <a16:creationId xmlns="" xmlns:a16="http://schemas.microsoft.com/office/drawing/2014/main" id="{3016A5BA-F72A-4CD9-AF4C-68ADAC202004}"/>
               </a:ext>
             </a:extLst>
           </p:cNvPr>
@@ -6131,9 +6164,10 @@
           <a:lstStyle/>
           <a:p>
             <a:r>
-              <a:rPr lang="en-US" dirty="0"/>
+              <a:rPr lang="en-US" dirty="0" smtClean="0"/>
               <a:t>Requirements (User and System Level)</a:t>
             </a:r>
+            <a:endParaRPr lang="en-US" dirty="0"/>
           </a:p>
         </p:txBody>
       </p:sp>
@@ -6142,7 +6176,7 @@
           <p:cNvPr id="3" name="Content Placeholder 2">
             <a:extLst>
               <a:ext uri="{FF2B5EF4-FFF2-40B4-BE49-F238E27FC236}">
-                <a16:creationId xmlns:a16="http://schemas.microsoft.com/office/drawing/2014/main" id="{BAC61804-0702-4E9C-9632-1F546949E17F}"/>
+                <a16:creationId xmlns="" xmlns:a16="http://schemas.microsoft.com/office/drawing/2014/main" id="{BAC61804-0702-4E9C-9632-1F546949E17F}"/>
               </a:ext>
             </a:extLst>
           </p:cNvPr>
@@ -6166,17 +6200,29 @@
           <a:lstStyle/>
           <a:p>
             <a:r>
-              <a:rPr lang="en-US" dirty="0"/>
-              <a:t>2.3  Users shall have the ability to provide a test case where several tests are sent in quick succession to demonstrate the application executes tests concurrently.</a:t>
-            </a:r>
-          </a:p>
-          <a:p>
-            <a:endParaRPr lang="en-US" dirty="0"/>
-          </a:p>
-          <a:p>
-            <a:r>
-              <a:rPr lang="en-US" dirty="0"/>
-              <a:t>2.3.1	The test case shall consist of several tests of varying duration that can run simultaneously. [0]</a:t>
+              <a:rPr lang="en-US" dirty="0" smtClean="0"/>
+              <a:t>2.3  Users </a:t>
+            </a:r>
+            <a:r>
+              <a:rPr lang="en-US" dirty="0"/>
+              <a:t>shall have the ability to provide a test case where several tests are sent in quick succession to demonstrate the application executes tests concurrently</a:t>
+            </a:r>
+            <a:r>
+              <a:rPr lang="en-US" dirty="0" smtClean="0"/>
+              <a:t>.</a:t>
+            </a:r>
+          </a:p>
+          <a:p>
+            <a:endParaRPr lang="en-US" dirty="0" smtClean="0"/>
+          </a:p>
+          <a:p>
+            <a:r>
+              <a:rPr lang="en-US" dirty="0" smtClean="0"/>
+              <a:t>2.3.1</a:t>
+            </a:r>
+            <a:r>
+              <a:rPr lang="en-US" dirty="0"/>
+              <a:t>	The test case shall consist of several tests of varying duration that can run simultaneously. [0]</a:t>
             </a:r>
           </a:p>
           <a:p>
@@ -6194,22 +6240,34 @@
           <a:p>
             <a:pPr lvl="1"/>
             <a:r>
-              <a:rPr lang="en-US" dirty="0"/>
-              <a:t>2.3.3.1 The system shall allow specification of the thread pool size. [1]</a:t>
+              <a:rPr lang="en-US" dirty="0" smtClean="0"/>
+              <a:t>2.3.3.1 The </a:t>
+            </a:r>
+            <a:r>
+              <a:rPr lang="en-US" dirty="0"/>
+              <a:t>system shall allow specification of the thread pool size. [1]</a:t>
             </a:r>
           </a:p>
           <a:p>
             <a:pPr lvl="1"/>
             <a:r>
-              <a:rPr lang="en-US" dirty="0"/>
-              <a:t>2.3.3.2 The starting default minimum thread count shall be 5. [1]</a:t>
+              <a:rPr lang="en-US" dirty="0" smtClean="0"/>
+              <a:t>2.3.3.2 The </a:t>
+            </a:r>
+            <a:r>
+              <a:rPr lang="en-US" dirty="0"/>
+              <a:t>starting default minimum thread count shall be 5. [1]</a:t>
             </a:r>
           </a:p>
           <a:p>
             <a:pPr lvl="1"/>
             <a:r>
-              <a:rPr lang="en-US" dirty="0"/>
-              <a:t>2.3.3.3 The starting default maximum thread count shall be 15 (this keeps the application from spawning too many threads). [1]</a:t>
+              <a:rPr lang="en-US" dirty="0" smtClean="0"/>
+              <a:t>2.3.3.3 The </a:t>
+            </a:r>
+            <a:r>
+              <a:rPr lang="en-US" dirty="0"/>
+              <a:t>starting default maximum thread count shall be 15 (this keeps the application from spawning too many threads). [1]</a:t>
             </a:r>
           </a:p>
         </p:txBody>
@@ -6260,9 +6318,10 @@
           <a:lstStyle/>
           <a:p>
             <a:r>
-              <a:rPr lang="en-US" dirty="0"/>
+              <a:rPr lang="en-US" dirty="0" smtClean="0"/>
               <a:t>Requirements (User and System Level)</a:t>
             </a:r>
+            <a:endParaRPr lang="en-US" dirty="0"/>
           </a:p>
         </p:txBody>
       </p:sp>
@@ -6289,8 +6348,12 @@
           <a:lstStyle/>
           <a:p>
             <a:r>
-              <a:rPr lang="en-US" dirty="0"/>
-              <a:t>2.4  The test engine shall run on Windows platform and should run on Linux and Mac platforms. User access to the system shall be provided through a Web User Interface (</a:t>
+              <a:rPr lang="en-US" dirty="0" smtClean="0"/>
+              <a:t>2.4  The </a:t>
+            </a:r>
+            <a:r>
+              <a:rPr lang="en-US" dirty="0"/>
+              <a:t>test engine shall run on Windows platform and should run on Linux and Mac platforms. User access to the system shall be provided through a Web User Interface (</a:t>
             </a:r>
             <a:r>
               <a:rPr lang="en-US" dirty="0" err="1"/>
@@ -6308,15 +6371,19 @@
               <a:rPr lang="en-US" dirty="0"/>
               <a:t> shall support the Firefox web browser and should support Google Chrome and Microsoft Edge.</a:t>
             </a:r>
-            <a:endParaRPr lang="en-US" b="1" dirty="0"/>
-          </a:p>
-          <a:p>
-            <a:endParaRPr lang="en-US" dirty="0"/>
-          </a:p>
-          <a:p>
-            <a:r>
-              <a:rPr lang="en-US" dirty="0"/>
-              <a:t>2.4.1	The test engine shall be an application that can run on the Windows platform. [0]</a:t>
+            <a:endParaRPr lang="en-US" b="1" dirty="0" smtClean="0"/>
+          </a:p>
+          <a:p>
+            <a:endParaRPr lang="en-US" dirty="0" smtClean="0"/>
+          </a:p>
+          <a:p>
+            <a:r>
+              <a:rPr lang="en-US" dirty="0" smtClean="0"/>
+              <a:t>2.4.1</a:t>
+            </a:r>
+            <a:r>
+              <a:rPr lang="en-US" dirty="0"/>
+              <a:t>	The test engine shall be an application that can run on the Windows platform. [0]</a:t>
             </a:r>
           </a:p>
           <a:p>
@@ -6336,21 +6403,37 @@
             </a:r>
             <a:r>
               <a:rPr lang="en-US" dirty="0"/>
-              <a:t> to be accessed via a standard web browser. [1]</a:t>
+              <a:t> to be accessed via a standard web </a:t>
+            </a:r>
+            <a:r>
+              <a:rPr lang="en-US" dirty="0" smtClean="0"/>
+              <a:t>browser</a:t>
+            </a:r>
+            <a:r>
+              <a:rPr lang="en-US" dirty="0"/>
+              <a:t>. [1]</a:t>
             </a:r>
           </a:p>
           <a:p>
             <a:pPr lvl="1"/>
             <a:r>
-              <a:rPr lang="en-US" dirty="0"/>
-              <a:t>2.4.3.1  The system shall support the Firefox web browser. [1]</a:t>
+              <a:rPr lang="en-US" dirty="0" smtClean="0"/>
+              <a:t>2.4.3.1  The </a:t>
+            </a:r>
+            <a:r>
+              <a:rPr lang="en-US" dirty="0"/>
+              <a:t>system shall support the Firefox web browser. [1]</a:t>
             </a:r>
           </a:p>
           <a:p>
             <a:pPr lvl="1"/>
             <a:r>
-              <a:rPr lang="en-US" dirty="0"/>
-              <a:t>2.4.3.2  The system should support the Microsoft Edge and Google Chrome web browsers. [2]</a:t>
+              <a:rPr lang="en-US" dirty="0" smtClean="0"/>
+              <a:t>2.4.3.2  The </a:t>
+            </a:r>
+            <a:r>
+              <a:rPr lang="en-US" dirty="0"/>
+              <a:t>system should support the Microsoft Edge and Google Chrome web browsers. [2]</a:t>
             </a:r>
           </a:p>
           <a:p>
@@ -6404,9 +6487,10 @@
           <a:lstStyle/>
           <a:p>
             <a:r>
-              <a:rPr lang="en-US" dirty="0"/>
+              <a:rPr lang="en-US" dirty="0" smtClean="0"/>
               <a:t>Requirements (User and System Level)</a:t>
             </a:r>
+            <a:endParaRPr lang="en-US" dirty="0"/>
           </a:p>
         </p:txBody>
       </p:sp>
@@ -6433,16 +6517,16 @@
           <a:lstStyle/>
           <a:p>
             <a:r>
-              <a:rPr lang="en-US"/>
+              <a:rPr lang="en-US" smtClean="0"/>
               <a:t>2.5  The system shall handle application failures and errors as well as test failures and errors.</a:t>
             </a:r>
           </a:p>
           <a:p>
-            <a:endParaRPr lang="en-US"/>
-          </a:p>
-          <a:p>
-            <a:r>
-              <a:rPr lang="en-US"/>
+            <a:endParaRPr lang="en-US" smtClean="0"/>
+          </a:p>
+          <a:p>
+            <a:r>
+              <a:rPr lang="en-US" smtClean="0"/>
               <a:t>2.5.1	The system shall handle exceptions thrown by the application during testing with clear user 	output. [0]</a:t>
             </a:r>
           </a:p>
@@ -6497,9 +6581,10 @@
           <a:lstStyle/>
           <a:p>
             <a:r>
-              <a:rPr lang="en-US" dirty="0"/>
+              <a:rPr lang="en-US" dirty="0" smtClean="0"/>
               <a:t>Requirements (User and System Level)</a:t>
             </a:r>
+            <a:endParaRPr lang="en-US" dirty="0"/>
           </a:p>
         </p:txBody>
       </p:sp>
@@ -6526,8 +6611,16 @@
           <a:lstStyle/>
           <a:p>
             <a:r>
-              <a:rPr lang="en-US" dirty="0"/>
-              <a:t>2.6  The system shall be user friendly, have a graphic user interface, and use a web-enabled client (browser). The system shall be installable locally on the user’s machine and use its own desktop interface.</a:t>
+              <a:rPr lang="en-US" dirty="0" smtClean="0"/>
+              <a:t>2.6  The </a:t>
+            </a:r>
+            <a:r>
+              <a:rPr lang="en-US" dirty="0"/>
+              <a:t>system shall be user friendly, have a graphic user interface, and use a web-enabled client (browser). The system shall be installable locally on the user’s machine and use its own desktop interface</a:t>
+            </a:r>
+            <a:r>
+              <a:rPr lang="en-US" dirty="0" smtClean="0"/>
+              <a:t>.</a:t>
             </a:r>
           </a:p>
           <a:p>
@@ -6576,36 +6669,64 @@
           <a:p>
             <a:pPr lvl="1"/>
             <a:r>
-              <a:rPr lang="en-US" dirty="0"/>
-              <a:t>2.6.4.1  Display all possible tests and allow the user to select all tests they wish to run. [0]</a:t>
+              <a:rPr lang="en-US" dirty="0" smtClean="0"/>
+              <a:t>2.6.4.1  Display </a:t>
+            </a:r>
+            <a:r>
+              <a:rPr lang="en-US" dirty="0"/>
+              <a:t>all possible tests and allow the user to select all tests they wish to run. </a:t>
+            </a:r>
+            <a:r>
+              <a:rPr lang="en-US" dirty="0" smtClean="0"/>
+              <a:t>[</a:t>
+            </a:r>
+            <a:r>
+              <a:rPr lang="en-US" dirty="0"/>
+              <a:t>0]</a:t>
             </a:r>
           </a:p>
           <a:p>
             <a:pPr lvl="1"/>
             <a:r>
-              <a:rPr lang="en-US" dirty="0"/>
-              <a:t>2.6.4.2  Display the selected list of all tests to be run (container object on GUI). [0]</a:t>
+              <a:rPr lang="en-US" dirty="0" smtClean="0"/>
+              <a:t>2.6.4.2  Display </a:t>
+            </a:r>
+            <a:r>
+              <a:rPr lang="en-US" dirty="0"/>
+              <a:t>the selected list of all tests to be run (container object on GUI). [0]</a:t>
             </a:r>
           </a:p>
           <a:p>
             <a:pPr lvl="1"/>
             <a:r>
-              <a:rPr lang="en-US" dirty="0"/>
-              <a:t>2.6.4.3  Show test progress and status on the GUI. [0]</a:t>
+              <a:rPr lang="en-US" dirty="0" smtClean="0"/>
+              <a:t>2.6.4.3  Show </a:t>
+            </a:r>
+            <a:r>
+              <a:rPr lang="en-US" dirty="0"/>
+              <a:t>test progress and status on the GUI. [0]</a:t>
             </a:r>
           </a:p>
           <a:p>
             <a:pPr lvl="1"/>
             <a:r>
-              <a:rPr lang="en-US" dirty="0"/>
-              <a:t>2.6.4.4  Display the results of each test in real-time. [1]</a:t>
+              <a:rPr lang="en-US" dirty="0" smtClean="0"/>
+              <a:t>2.6.4.4  Display </a:t>
+            </a:r>
+            <a:r>
+              <a:rPr lang="en-US" dirty="0"/>
+              <a:t>the results of each test in real-time. [1]</a:t>
             </a:r>
           </a:p>
           <a:p>
             <a:pPr lvl="1"/>
             <a:r>
-              <a:rPr lang="en-US" dirty="0"/>
-              <a:t>2.6.4.5  Allow the user to specify an output file in which to log the test results. [1]</a:t>
+              <a:rPr lang="en-US" dirty="0" smtClean="0"/>
+              <a:t>2.6.4.5  Allow </a:t>
+            </a:r>
+            <a:r>
+              <a:rPr lang="en-US" dirty="0"/>
+              <a:t>the user to specify an output file in which to log the test results. [1]</a:t>
             </a:r>
           </a:p>
         </p:txBody>
@@ -6661,16 +6782,25 @@
           <a:lstStyle/>
           <a:p>
             <a:r>
-              <a:rPr lang="en-US" dirty="0"/>
-              <a:t>Requirements (User and System Level)</a:t>
+              <a:rPr lang="en-US" dirty="0" smtClean="0"/>
+              <a:t>Requirements </a:t>
+            </a:r>
+            <a:r>
+              <a:rPr lang="en-US" dirty="0"/>
+              <a:t>(User and System Level</a:t>
+            </a:r>
+            <a:r>
+              <a:rPr lang="en-US" dirty="0" smtClean="0"/>
+              <a:t>)</a:t>
             </a:r>
             <a:br>
-              <a:rPr lang="en-US" dirty="0"/>
+              <a:rPr lang="en-US" dirty="0" smtClean="0"/>
             </a:br>
             <a:r>
-              <a:rPr lang="en-US" dirty="0"/>
+              <a:rPr lang="en-US" dirty="0" smtClean="0"/>
               <a:t>2.6 Continued</a:t>
             </a:r>
+            <a:endParaRPr lang="en-US" dirty="0"/>
           </a:p>
         </p:txBody>
       </p:sp>
@@ -6707,50 +6837,86 @@
           <a:p>
             <a:pPr lvl="1"/>
             <a:r>
-              <a:rPr lang="en-US" dirty="0"/>
-              <a:t>2.6.5.1  Display all possible tests and allow the user to select all tests they wish to run. [1]</a:t>
+              <a:rPr lang="en-US" dirty="0" smtClean="0"/>
+              <a:t>2.6.5.1  Display </a:t>
+            </a:r>
+            <a:r>
+              <a:rPr lang="en-US" dirty="0"/>
+              <a:t>all possible tests and allow the user to select all tests they wish to run. </a:t>
+            </a:r>
+            <a:r>
+              <a:rPr lang="en-US" dirty="0" smtClean="0"/>
+              <a:t>[</a:t>
+            </a:r>
+            <a:r>
+              <a:rPr lang="en-US" dirty="0"/>
+              <a:t>1]</a:t>
             </a:r>
           </a:p>
           <a:p>
             <a:pPr lvl="1"/>
             <a:r>
-              <a:rPr lang="en-US" dirty="0"/>
-              <a:t>2.6.5.2  Display the selected list of all tests to be run (container object on GUI). [1]</a:t>
+              <a:rPr lang="en-US" dirty="0" smtClean="0"/>
+              <a:t>2.6.5.2  Display </a:t>
+            </a:r>
+            <a:r>
+              <a:rPr lang="en-US" dirty="0"/>
+              <a:t>the selected list of all tests to be run (container object on GUI). [1]</a:t>
             </a:r>
           </a:p>
           <a:p>
             <a:pPr lvl="1"/>
             <a:r>
-              <a:rPr lang="en-US" dirty="0"/>
-              <a:t>2.6.5.3  Show test progress and status on the GUI. [1]</a:t>
+              <a:rPr lang="en-US" dirty="0" smtClean="0"/>
+              <a:t>2.6.5.3  Show </a:t>
+            </a:r>
+            <a:r>
+              <a:rPr lang="en-US" dirty="0"/>
+              <a:t>test progress and status on the GUI. [1]</a:t>
             </a:r>
           </a:p>
           <a:p>
             <a:pPr lvl="1"/>
             <a:r>
-              <a:rPr lang="en-US" dirty="0"/>
-              <a:t>2.6.5.4  Display the results of each test in real-time. [2]</a:t>
+              <a:rPr lang="en-US" dirty="0" smtClean="0"/>
+              <a:t>2.6.5.4  Display </a:t>
+            </a:r>
+            <a:r>
+              <a:rPr lang="en-US" dirty="0"/>
+              <a:t>the results of each test in real-time. [2]</a:t>
             </a:r>
           </a:p>
           <a:p>
             <a:pPr lvl="1"/>
             <a:r>
-              <a:rPr lang="en-US" dirty="0"/>
-              <a:t>2.6.5.5  Allow the user to specify an output file in which to log the test results. [2]</a:t>
+              <a:rPr lang="en-US" dirty="0" smtClean="0"/>
+              <a:t>2.6.5.5  Allow </a:t>
+            </a:r>
+            <a:r>
+              <a:rPr lang="en-US" dirty="0"/>
+              <a:t>the user to specify an output file in which to log the test results. [2]</a:t>
             </a:r>
           </a:p>
           <a:p>
             <a:pPr lvl="1"/>
             <a:r>
-              <a:rPr lang="en-US" dirty="0"/>
-              <a:t>2.6.5.6  Execute tests on available clients. [1]</a:t>
+              <a:rPr lang="en-US" dirty="0" smtClean="0"/>
+              <a:t>2.6.5.6  </a:t>
+            </a:r>
+            <a:r>
+              <a:rPr lang="en-US" dirty="0"/>
+              <a:t>Execute tests on available clients. [1]</a:t>
             </a:r>
           </a:p>
           <a:p>
             <a:pPr lvl="1"/>
             <a:r>
-              <a:rPr lang="en-US" dirty="0"/>
-              <a:t>2.6.5.7  Export current and prior test results for specific clients. [2]</a:t>
+              <a:rPr lang="en-US" dirty="0" smtClean="0"/>
+              <a:t>2.6.5.7  </a:t>
+            </a:r>
+            <a:r>
+              <a:rPr lang="en-US" dirty="0"/>
+              <a:t>Export current and prior test results for specific clients. [2]</a:t>
             </a:r>
           </a:p>
           <a:p>
@@ -6804,9 +6970,10 @@
           <a:lstStyle/>
           <a:p>
             <a:r>
-              <a:rPr lang="en-US" dirty="0"/>
+              <a:rPr lang="en-US" dirty="0" smtClean="0"/>
               <a:t>Requirements (User and System Level)</a:t>
             </a:r>
+            <a:endParaRPr lang="en-US" dirty="0"/>
           </a:p>
         </p:txBody>
       </p:sp>
@@ -6833,8 +7000,12 @@
           <a:lstStyle/>
           <a:p>
             <a:r>
-              <a:rPr lang="en-US" dirty="0"/>
-              <a:t>2.7  The user shall log into the system via the </a:t>
+              <a:rPr lang="en-US" dirty="0" smtClean="0"/>
+              <a:t>2.7  The </a:t>
+            </a:r>
+            <a:r>
+              <a:rPr lang="en-US" dirty="0"/>
+              <a:t>user shall log into the system via the </a:t>
             </a:r>
             <a:r>
               <a:rPr lang="en-US" dirty="0" err="1"/>
@@ -6842,7 +7013,11 @@
             </a:r>
             <a:r>
               <a:rPr lang="en-US" dirty="0"/>
-              <a:t> and the system will authenticate the user.  Once logged into the system and user role determination has been made, the user can register/de-register his/her machine with the Test Server.</a:t>
+              <a:t> and the system will authenticate the user.  Once logged into the system and user role determination has been made, the user can register/de-register his/her machine with the Test Server</a:t>
+            </a:r>
+            <a:r>
+              <a:rPr lang="en-US" dirty="0" smtClean="0"/>
+              <a:t>.</a:t>
             </a:r>
           </a:p>
           <a:p>
@@ -6874,6 +7049,7 @@
               <a:rPr lang="en-US" dirty="0"/>
               <a:t>2.7.4	The user shall have the ability to de-register their local test engine with the test server. [1]</a:t>
             </a:r>
+            <a:endParaRPr lang="en-US" dirty="0"/>
           </a:p>
         </p:txBody>
       </p:sp>
@@ -6923,9 +7099,10 @@
           <a:lstStyle/>
           <a:p>
             <a:r>
-              <a:rPr lang="en-US" dirty="0"/>
+              <a:rPr lang="en-US" dirty="0" smtClean="0"/>
               <a:t>Requirements (User and System Level)</a:t>
             </a:r>
+            <a:endParaRPr lang="en-US" dirty="0"/>
           </a:p>
         </p:txBody>
       </p:sp>
@@ -6952,8 +7129,20 @@
           <a:lstStyle/>
           <a:p>
             <a:r>
-              <a:rPr lang="en-US" dirty="0"/>
-              <a:t>2.8  The system shall be highly available and disaster recoverable. The system will have a production environment that is usable by multiple users implemented in multiple regions and availability zones in the cloud. [2]</a:t>
+              <a:rPr lang="en-US" dirty="0" smtClean="0"/>
+              <a:t>2.8  </a:t>
+            </a:r>
+            <a:r>
+              <a:rPr lang="en-US" dirty="0" smtClean="0"/>
+              <a:t>The </a:t>
+            </a:r>
+            <a:r>
+              <a:rPr lang="en-US" dirty="0"/>
+              <a:t>system shall be highly available and disaster recoverable. The system will have a production environment that is usable by multiple users implemented in multiple regions and availability zones in the cloud. [2</a:t>
+            </a:r>
+            <a:r>
+              <a:rPr lang="en-US" dirty="0" smtClean="0"/>
+              <a:t>]</a:t>
             </a:r>
           </a:p>
           <a:p>
@@ -6964,38 +7153,90 @@
           </a:p>
           <a:p>
             <a:r>
-              <a:rPr lang="en-US" dirty="0"/>
-              <a:t>2.8.1	The user shall have the ability to install the test engine on multiple machines (redundancy, performance, latency). [0]</a:t>
-            </a:r>
-          </a:p>
-          <a:p>
-            <a:r>
-              <a:rPr lang="en-US" dirty="0"/>
-              <a:t>2.8.2   The system shall maintain all program code in scripts that can be deployed to the cloud platform. 	System source code and data shall be stored in a fault-tolerant, distributed file system such as 	Amazon S3 or HDFS where it can be accessible and deployed to support disaster recovery and 	availability requirements. [2]</a:t>
-            </a:r>
-          </a:p>
-          <a:p>
-            <a:r>
-              <a:rPr lang="en-US" dirty="0"/>
-              <a:t>2.8.3   Backup copies of all scripts shall be located in a separate region. [2]</a:t>
-            </a:r>
-          </a:p>
-          <a:p>
-            <a:r>
-              <a:rPr lang="en-US" dirty="0"/>
-              <a:t>2.8.4   System source code shall be deployed to cloud instances hosted in several regions and availability zones. [2]</a:t>
-            </a:r>
-          </a:p>
-          <a:p>
-            <a:r>
-              <a:rPr lang="en-US" dirty="0"/>
-              <a:t>2.8.5	 Access to the system shall be controlled using defined, cloud managed IAM roles, which will allow for configurable levels of access to and control over the system and its resources. [1]</a:t>
-            </a:r>
-          </a:p>
-          <a:p>
-            <a:r>
-              <a:rPr lang="en-US" dirty="0"/>
-              <a:t>2.8.6	 The test environment shall be implemented in multiple zones and multiple regions to enable testing of HA/DR requirements rather than taking production down. [3]</a:t>
+              <a:rPr lang="en-US" dirty="0" smtClean="0"/>
+              <a:t>2.8.1</a:t>
+            </a:r>
+            <a:r>
+              <a:rPr lang="en-US" dirty="0"/>
+              <a:t>	The user shall have the ability to install the test engine on multiple machines (redundancy, performance, latency). [0]</a:t>
+            </a:r>
+          </a:p>
+          <a:p>
+            <a:r>
+              <a:rPr lang="en-US" dirty="0" smtClean="0"/>
+              <a:t>2.8.2   </a:t>
+            </a:r>
+            <a:r>
+              <a:rPr lang="en-US" dirty="0" smtClean="0"/>
+              <a:t>The </a:t>
+            </a:r>
+            <a:r>
+              <a:rPr lang="en-US" dirty="0"/>
+              <a:t>system shall maintain all program code in scripts that can be deployed to the cloud platform. 	System source code and data shall be stored in a fault-tolerant, distributed file system such as 	Amazon S3 or HDFS where it can be accessible and deployed to support disaster recovery and 	availability requirements. [2]</a:t>
+            </a:r>
+          </a:p>
+          <a:p>
+            <a:r>
+              <a:rPr lang="en-US" dirty="0" smtClean="0"/>
+              <a:t>2.8.3   </a:t>
+            </a:r>
+            <a:r>
+              <a:rPr lang="en-US" dirty="0" smtClean="0"/>
+              <a:t>Backup </a:t>
+            </a:r>
+            <a:r>
+              <a:rPr lang="en-US" dirty="0"/>
+              <a:t>copies of all scripts shall be located in a separate region. [2]</a:t>
+            </a:r>
+          </a:p>
+          <a:p>
+            <a:r>
+              <a:rPr lang="en-US" dirty="0" smtClean="0"/>
+              <a:t>2.8.4   </a:t>
+            </a:r>
+            <a:r>
+              <a:rPr lang="en-US" dirty="0" smtClean="0"/>
+              <a:t>System </a:t>
+            </a:r>
+            <a:r>
+              <a:rPr lang="en-US" dirty="0"/>
+              <a:t>source code shall be deployed to cloud instances hosted in several regions and availability zones. [2]</a:t>
+            </a:r>
+          </a:p>
+          <a:p>
+            <a:r>
+              <a:rPr lang="en-US" dirty="0" smtClean="0"/>
+              <a:t>2.8.5</a:t>
+            </a:r>
+            <a:r>
+              <a:rPr lang="en-US" dirty="0"/>
+              <a:t>	</a:t>
+            </a:r>
+            <a:r>
+              <a:rPr lang="en-US" dirty="0" smtClean="0"/>
+              <a:t> Access </a:t>
+            </a:r>
+            <a:r>
+              <a:rPr lang="en-US" dirty="0"/>
+              <a:t>to the system shall be controlled using defined, cloud managed IAM roles, which will allow for configurable levels of access to and control over the system and its resources. [1]</a:t>
+            </a:r>
+          </a:p>
+          <a:p>
+            <a:r>
+              <a:rPr lang="en-US" dirty="0" smtClean="0"/>
+              <a:t>2.8.6</a:t>
+            </a:r>
+            <a:r>
+              <a:rPr lang="en-US" dirty="0"/>
+              <a:t>	</a:t>
+            </a:r>
+            <a:r>
+              <a:rPr lang="en-US" dirty="0" smtClean="0"/>
+              <a:t> The </a:t>
+            </a:r>
+            <a:r>
+              <a:rPr lang="en-US" dirty="0"/>
+              <a:t>test environment shall be implemented in multiple zones and multiple regions to enable testing of HA/DR requirements rather than taking production down. [3]</a:t>
             </a:r>
           </a:p>
         </p:txBody>
@@ -7189,20 +7430,32 @@
           <a:lstStyle/>
           <a:p>
             <a:r>
+              <a:rPr lang="en-US" sz="2000" dirty="0" smtClean="0"/>
+              <a:t>4.1.1</a:t>
+            </a:r>
+            <a:r>
               <a:rPr lang="en-US" sz="2000" dirty="0"/>
-              <a:t>4.1.1	The system shall be developed using the C++ programming language and the C++ Standard Template Library (STL). [0]</a:t>
-            </a:r>
-          </a:p>
-          <a:p>
+              <a:t>	The system shall be developed using the C++ programming language and the C++ Standard Template Library (STL). [0]</a:t>
+            </a:r>
+          </a:p>
+          <a:p>
+            <a:r>
+              <a:rPr lang="en-US" sz="2000" dirty="0" smtClean="0"/>
+              <a:t>4.1.2</a:t>
+            </a:r>
             <a:r>
               <a:rPr lang="en-US" sz="2000" dirty="0"/>
-              <a:t>4.1.2	The system shall be developed using a publicly available source code editor which supports the C++ language. [0]</a:t>
-            </a:r>
-          </a:p>
-          <a:p>
+              <a:t>	The system shall be developed using a publicly available source code editor which supports the C++ language. [0]</a:t>
+            </a:r>
+          </a:p>
+          <a:p>
+            <a:r>
+              <a:rPr lang="en-US" sz="2000" dirty="0" smtClean="0"/>
+              <a:t>4.1.3    </a:t>
+            </a:r>
             <a:r>
               <a:rPr lang="en-US" sz="2000" dirty="0"/>
-              <a:t>4.1.3    The system shall have at least 75% unit test coverage of the source code. [1]</a:t>
+              <a:t>The system shall have at least 75% unit test coverage of the source code. [1]</a:t>
             </a:r>
           </a:p>
         </p:txBody>
@@ -7393,14 +7646,22 @@
           <a:lstStyle/>
           <a:p>
             <a:r>
+              <a:rPr lang="en-US" sz="2000" dirty="0" smtClean="0"/>
+              <a:t>4.2.1     </a:t>
+            </a:r>
+            <a:r>
               <a:rPr lang="en-US" sz="2000" dirty="0"/>
-              <a:t>4.2.1     Granting access to a new user of the system shall take no more than 1 business day to complete. [0]</a:t>
-            </a:r>
-          </a:p>
-          <a:p>
+              <a:t>Granting access to a new user of the system shall take no more than 1 business day to complete. [0]</a:t>
+            </a:r>
+          </a:p>
+          <a:p>
+            <a:r>
+              <a:rPr lang="en-US" sz="2000" dirty="0" smtClean="0"/>
+              <a:t>4.2.2     </a:t>
+            </a:r>
             <a:r>
               <a:rPr lang="en-US" sz="2000" dirty="0"/>
-              <a:t>4.2.2     Modifying or removing a user’s access to the system shall take no more than 1 business day to complete. [0]</a:t>
+              <a:t>Modifying or removing a user’s access to the system shall take no more than 1 business day to complete. [0]</a:t>
             </a:r>
           </a:p>
         </p:txBody>
@@ -7478,14 +7739,22 @@
           <a:lstStyle/>
           <a:p>
             <a:r>
+              <a:rPr lang="en-US" sz="2000" dirty="0" smtClean="0"/>
+              <a:t>4.3.1</a:t>
+            </a:r>
+            <a:r>
               <a:rPr lang="en-US" sz="2000" dirty="0"/>
-              <a:t>4.3.1	Disaster recovery shall be cost-effective and managed through the fault tolerance and high availability features of the cloud-based system architecture. [1]</a:t>
-            </a:r>
-          </a:p>
-          <a:p>
+              <a:t>	Disaster recovery shall be cost-effective and managed through the fault tolerance and high availability features of the cloud-based system architecture. [1]</a:t>
+            </a:r>
+          </a:p>
+          <a:p>
+            <a:r>
+              <a:rPr lang="en-US" sz="2000" dirty="0" smtClean="0"/>
+              <a:t>4.3.2      </a:t>
+            </a:r>
             <a:r>
               <a:rPr lang="en-US" sz="2000" dirty="0"/>
-              <a:t>4.3.2      User training shall take no more than 1 business day to complete, regardless of the user’s role. [2]</a:t>
+              <a:t>User training shall take no more than 1 business day to complete, regardless of the user’s role. [2]</a:t>
             </a:r>
           </a:p>
           <a:p>
@@ -7550,7 +7819,7 @@
           <p:cNvPr id="4" name="Picture 3">
             <a:extLst>
               <a:ext uri="{FF2B5EF4-FFF2-40B4-BE49-F238E27FC236}">
-                <a16:creationId xmlns:a16="http://schemas.microsoft.com/office/drawing/2014/main" id="{FA00AEF5-55CF-4716-B10D-11660D42C9F5}"/>
+                <a16:creationId xmlns="" xmlns:a16="http://schemas.microsoft.com/office/drawing/2014/main" id="{FA00AEF5-55CF-4716-B10D-11660D42C9F5}"/>
               </a:ext>
             </a:extLst>
           </p:cNvPr>
@@ -7580,7 +7849,7 @@
           <p:cNvPr id="6" name="Picture 5">
             <a:extLst>
               <a:ext uri="{FF2B5EF4-FFF2-40B4-BE49-F238E27FC236}">
-                <a16:creationId xmlns:a16="http://schemas.microsoft.com/office/drawing/2014/main" id="{2CE94564-7E21-42B5-B0C3-7B175B692FB4}"/>
+                <a16:creationId xmlns="" xmlns:a16="http://schemas.microsoft.com/office/drawing/2014/main" id="{2CE94564-7E21-42B5-B0C3-7B175B692FB4}"/>
               </a:ext>
             </a:extLst>
           </p:cNvPr>
@@ -7610,7 +7879,7 @@
           <p:cNvPr id="8" name="Picture 7">
             <a:extLst>
               <a:ext uri="{FF2B5EF4-FFF2-40B4-BE49-F238E27FC236}">
-                <a16:creationId xmlns:a16="http://schemas.microsoft.com/office/drawing/2014/main" id="{9A5C1814-5B60-480F-9900-D25FA371C13D}"/>
+                <a16:creationId xmlns="" xmlns:a16="http://schemas.microsoft.com/office/drawing/2014/main" id="{9A5C1814-5B60-480F-9900-D25FA371C13D}"/>
               </a:ext>
             </a:extLst>
           </p:cNvPr>
@@ -7692,7 +7961,7 @@
           <p:cNvPr id="5" name="Picture 4">
             <a:extLst>
               <a:ext uri="{FF2B5EF4-FFF2-40B4-BE49-F238E27FC236}">
-                <a16:creationId xmlns:a16="http://schemas.microsoft.com/office/drawing/2014/main" id="{13B04C9D-E45A-4DE2-AF80-B1367C691FAE}"/>
+                <a16:creationId xmlns="" xmlns:a16="http://schemas.microsoft.com/office/drawing/2014/main" id="{13B04C9D-E45A-4DE2-AF80-B1367C691FAE}"/>
               </a:ext>
             </a:extLst>
           </p:cNvPr>
@@ -7771,10 +8040,10 @@
       </p:sp>
       <p:pic>
         <p:nvPicPr>
-          <p:cNvPr id="5" name="Picture 4">
+          <p:cNvPr id="9" name="Picture 8">
             <a:extLst>
               <a:ext uri="{FF2B5EF4-FFF2-40B4-BE49-F238E27FC236}">
-                <a16:creationId xmlns:a16="http://schemas.microsoft.com/office/drawing/2014/main" id="{FB298827-6BC9-41F1-BAFC-D3F294B5FBED}"/>
+                <a16:creationId xmlns="" xmlns:a16="http://schemas.microsoft.com/office/drawing/2014/main" id="{B50AD3E8-FD4C-4543-9C8F-D6BCED40866F}"/>
               </a:ext>
             </a:extLst>
           </p:cNvPr>
@@ -7791,8 +8060,38 @@
         </p:blipFill>
         <p:spPr>
           <a:xfrm>
-            <a:off x="850108" y="1288474"/>
-            <a:ext cx="7587309" cy="5373417"/>
+            <a:off x="888886" y="1422398"/>
+            <a:ext cx="6076894" cy="5036705"/>
+          </a:xfrm>
+          <a:prstGeom prst="rect">
+            <a:avLst/>
+          </a:prstGeom>
+        </p:spPr>
+      </p:pic>
+      <p:pic>
+        <p:nvPicPr>
+          <p:cNvPr id="4" name="Picture 3">
+            <a:extLst>
+              <a:ext uri="{FF2B5EF4-FFF2-40B4-BE49-F238E27FC236}">
+                <a16:creationId xmlns="" xmlns:a16="http://schemas.microsoft.com/office/drawing/2014/main" id="{79E925FD-1F10-4036-9F0A-7FC0A5C14A78}"/>
+              </a:ext>
+            </a:extLst>
+          </p:cNvPr>
+          <p:cNvPicPr>
+            <a:picLocks noChangeAspect="1"/>
+          </p:cNvPicPr>
+          <p:nvPr/>
+        </p:nvPicPr>
+        <p:blipFill>
+          <a:blip r:embed="rId3"/>
+          <a:stretch>
+            <a:fillRect/>
+          </a:stretch>
+        </p:blipFill>
+        <p:spPr>
+          <a:xfrm>
+            <a:off x="6499020" y="1485903"/>
+            <a:ext cx="2385335" cy="3441698"/>
           </a:xfrm>
           <a:prstGeom prst="rect">
             <a:avLst/>
@@ -8351,7 +8650,7 @@
           <p:cNvPr id="6" name="Picture 5">
             <a:extLst>
               <a:ext uri="{FF2B5EF4-FFF2-40B4-BE49-F238E27FC236}">
-                <a16:creationId xmlns:a16="http://schemas.microsoft.com/office/drawing/2014/main" id="{42F62902-0B99-45F6-8313-405C7CFCB586}"/>
+                <a16:creationId xmlns="" xmlns:a16="http://schemas.microsoft.com/office/drawing/2014/main" id="{42F62902-0B99-45F6-8313-405C7CFCB586}"/>
               </a:ext>
             </a:extLst>
           </p:cNvPr>
@@ -8980,9 +9279,10 @@
           <a:lstStyle/>
           <a:p>
             <a:r>
-              <a:rPr lang="en-US" dirty="0"/>
+              <a:rPr lang="en-US" dirty="0" smtClean="0"/>
               <a:t>Requirements (User and System Level)</a:t>
             </a:r>
+            <a:endParaRPr lang="en-US" dirty="0"/>
           </a:p>
         </p:txBody>
       </p:sp>
@@ -9009,23 +9309,56 @@
           <a:lstStyle/>
           <a:p>
             <a:r>
-              <a:rPr lang="en-US" dirty="0"/>
-              <a:t>2.1  The users of this Test Framework system shall have the ability to setup and run individual unit tests of program code, hardware, and infrastructure, as well as run multiple tests simultaneously. They need to be able to stress performance, ensure scalability, and diagnose system interface issues.  Test results shall be saved for future recall, and configuration of the system maintained and stored.</a:t>
-            </a:r>
-          </a:p>
-          <a:p>
-            <a:endParaRPr lang="en-US" dirty="0"/>
-          </a:p>
-          <a:p>
-            <a:r>
-              <a:rPr lang="en-US" dirty="0"/>
-              <a:t>2.1.1 	The test engine shall not require changing and recompiling the program each time a test is run. [0]</a:t>
-            </a:r>
-          </a:p>
-          <a:p>
-            <a:r>
-              <a:rPr lang="en-US" dirty="0"/>
-              <a:t>2.1.2	The system shall be implemented as a client-server system wherein the Web User Interface (</a:t>
+              <a:rPr lang="en-US" dirty="0" smtClean="0"/>
+              <a:t>2.1  The </a:t>
+            </a:r>
+            <a:r>
+              <a:rPr lang="en-US" dirty="0"/>
+              <a:t>users of this Test Framework system shall have the ability to setup and run individual unit tests of program code, hardware, and infrastructure, as well as run multiple tests simultaneously. They need to be able to stress performance, ensure scalability, and diagnose system interface issues.  Test results shall be saved for future recall, and configuration of the system maintained and stored</a:t>
+            </a:r>
+            <a:r>
+              <a:rPr lang="en-US" dirty="0" smtClean="0"/>
+              <a:t>.</a:t>
+            </a:r>
+          </a:p>
+          <a:p>
+            <a:endParaRPr lang="en-US" dirty="0" smtClean="0"/>
+          </a:p>
+          <a:p>
+            <a:r>
+              <a:rPr lang="en-US" dirty="0" smtClean="0"/>
+              <a:t>2.1.1 	The </a:t>
+            </a:r>
+            <a:r>
+              <a:rPr lang="en-US" dirty="0"/>
+              <a:t>test engine shall not require changing and recompiling the program each time a test is run. </a:t>
+            </a:r>
+            <a:r>
+              <a:rPr lang="en-US" dirty="0" smtClean="0"/>
+              <a:t>[</a:t>
+            </a:r>
+            <a:r>
+              <a:rPr lang="en-US" dirty="0"/>
+              <a:t>0]</a:t>
+            </a:r>
+            <a:endParaRPr lang="en-US" dirty="0" smtClean="0"/>
+          </a:p>
+          <a:p>
+            <a:r>
+              <a:rPr lang="en-US" dirty="0" smtClean="0"/>
+              <a:t>2.1.2</a:t>
+            </a:r>
+            <a:r>
+              <a:rPr lang="en-US" dirty="0"/>
+              <a:t>	</a:t>
+            </a:r>
+            <a:r>
+              <a:rPr lang="en-US" dirty="0" smtClean="0"/>
+              <a:t>The </a:t>
+            </a:r>
+            <a:r>
+              <a:rPr lang="en-US" dirty="0"/>
+              <a:t>system shall be implemented as a client-server system wherein the Web User Interface (</a:t>
             </a:r>
             <a:r>
               <a:rPr lang="en-US" dirty="0" err="1"/>
@@ -9038,14 +9371,30 @@
           </a:p>
           <a:p>
             <a:r>
-              <a:rPr lang="en-US" dirty="0"/>
-              <a:t>2.1.3	The system shall employ a database in which to store all test data, including configuration data, 	test cases, and test results. [1]</a:t>
-            </a:r>
-          </a:p>
-          <a:p>
-            <a:r>
-              <a:rPr lang="en-US" dirty="0"/>
-              <a:t>2.2.4	The system shall employ a test server, which will provide the business logic and serve as the API between the database and the </a:t>
+              <a:rPr lang="en-US" dirty="0" smtClean="0"/>
+              <a:t>2.1.3</a:t>
+            </a:r>
+            <a:r>
+              <a:rPr lang="en-US" dirty="0"/>
+              <a:t>	</a:t>
+            </a:r>
+            <a:r>
+              <a:rPr lang="en-US" dirty="0" smtClean="0"/>
+              <a:t>The </a:t>
+            </a:r>
+            <a:r>
+              <a:rPr lang="en-US" dirty="0"/>
+              <a:t>system shall employ a database in which to store all test data, including configuration data, 	test cases, and test results. [1]</a:t>
+            </a:r>
+          </a:p>
+          <a:p>
+            <a:r>
+              <a:rPr lang="en-US" dirty="0" smtClean="0"/>
+              <a:t>2.2.4</a:t>
+            </a:r>
+            <a:r>
+              <a:rPr lang="en-US" dirty="0"/>
+              <a:t>	The system shall employ a test server, which will provide the business logic and serve as the API between the database and the </a:t>
             </a:r>
             <a:r>
               <a:rPr lang="en-US" dirty="0" err="1"/>
@@ -9058,14 +9407,22 @@
           </a:p>
           <a:p>
             <a:r>
-              <a:rPr lang="en-US" dirty="0"/>
-              <a:t>2.1.5	The system shall be hosted on a cloud platform to support ease of resource acquisition and hosting, automatic scaling of system resources, built-in network infrastructure, managed services	where needed. [2]</a:t>
-            </a:r>
-          </a:p>
-          <a:p>
-            <a:r>
-              <a:rPr lang="en-US" dirty="0"/>
-              <a:t>2.1.6	The system shall allow the ability to create additional environments for specialized testing upon demand. [2]</a:t>
+              <a:rPr lang="en-US" dirty="0" smtClean="0"/>
+              <a:t>2.1.5</a:t>
+            </a:r>
+            <a:r>
+              <a:rPr lang="en-US" dirty="0"/>
+              <a:t>	The system shall be hosted on a cloud platform to support ease of resource acquisition and hosting, automatic scaling of system resources, built-in network infrastructure, managed services	where needed. [2]</a:t>
+            </a:r>
+          </a:p>
+          <a:p>
+            <a:r>
+              <a:rPr lang="en-US" dirty="0" smtClean="0"/>
+              <a:t>2.1.6</a:t>
+            </a:r>
+            <a:r>
+              <a:rPr lang="en-US" dirty="0"/>
+              <a:t>	The system shall allow the ability to create additional environments for specialized testing upon demand. [2]</a:t>
             </a:r>
           </a:p>
           <a:p>

</xml_diff>

<commit_message>
Reverting to WebUI versions.
</commit_message>
<xml_diff>
--- a/Test Framework Midterm Presentation.pptx
+++ b/Test Framework Midterm Presentation.pptx
@@ -5987,10 +5987,9 @@
           <a:lstStyle/>
           <a:p>
             <a:r>
-              <a:rPr lang="en-US" dirty="0" smtClean="0"/>
+              <a:rPr lang="en-US" dirty="0"/>
               <a:t>Requirements (User and System Level)</a:t>
             </a:r>
-            <a:endParaRPr lang="en-US" dirty="0"/>
           </a:p>
         </p:txBody>
       </p:sp>
@@ -6017,29 +6016,17 @@
           <a:lstStyle/>
           <a:p>
             <a:r>
-              <a:rPr lang="en-US" dirty="0" smtClean="0"/>
-              <a:t>2.2  The </a:t>
-            </a:r>
-            <a:r>
-              <a:rPr lang="en-US" dirty="0"/>
-              <a:t>user shall have the ability to view the results of the test as each test completes. He/she shall also have the ability to view the log files where all results and relevant output are stored. The logs should contain various levels of information depending on the specified log level and shall display a time and date stamp</a:t>
-            </a:r>
-            <a:r>
-              <a:rPr lang="en-US" dirty="0" smtClean="0"/>
-              <a:t>.</a:t>
-            </a:r>
-          </a:p>
-          <a:p>
-            <a:endParaRPr lang="en-US" dirty="0" smtClean="0"/>
-          </a:p>
-          <a:p>
-            <a:r>
-              <a:rPr lang="en-US" dirty="0" smtClean="0"/>
-              <a:t>2.2.1</a:t>
-            </a:r>
-            <a:r>
-              <a:rPr lang="en-US" dirty="0"/>
-              <a:t>	The system shall display whether each test failed or succeeded. [0]</a:t>
+              <a:rPr lang="en-US" dirty="0"/>
+              <a:t>2.2  The user shall have the ability to view the results of the test as each test completes. He/she shall also have the ability to view the log files where all results and relevant output are stored. The logs should contain various levels of information depending on the specified log level and shall display a time and date stamp.</a:t>
+            </a:r>
+          </a:p>
+          <a:p>
+            <a:endParaRPr lang="en-US" dirty="0"/>
+          </a:p>
+          <a:p>
+            <a:r>
+              <a:rPr lang="en-US" dirty="0"/>
+              <a:t>2.2.1	The system shall display whether each test failed or succeeded. [0]</a:t>
             </a:r>
           </a:p>
           <a:p>
@@ -6058,41 +6045,21 @@
             <a:pPr lvl="1"/>
             <a:r>
               <a:rPr lang="en-US" dirty="0"/>
-              <a:t>2.2.3.1	</a:t>
-            </a:r>
-            <a:r>
-              <a:rPr lang="en-US" dirty="0" smtClean="0"/>
-              <a:t>  INFO </a:t>
-            </a:r>
-            <a:r>
-              <a:rPr lang="en-US" dirty="0"/>
-              <a:t>shall describe specific information for test pass/fail reporting.</a:t>
+              <a:t>2.2.3.1	  INFO shall describe specific information for test pass/fail reporting.</a:t>
             </a:r>
           </a:p>
           <a:p>
             <a:pPr lvl="1"/>
             <a:r>
-              <a:rPr lang="en-US" dirty="0" smtClean="0"/>
-              <a:t>2.2.3.2  DEBUG </a:t>
-            </a:r>
-            <a:r>
-              <a:rPr lang="en-US" dirty="0"/>
-              <a:t>shall describe information provided by the programmer/developer to aid in debugging the test.</a:t>
+              <a:rPr lang="en-US" dirty="0"/>
+              <a:t>2.2.3.2  DEBUG shall describe information provided by the programmer/developer to aid in debugging the test.</a:t>
             </a:r>
           </a:p>
           <a:p>
             <a:pPr lvl="1"/>
             <a:r>
               <a:rPr lang="en-US" dirty="0"/>
-              <a:t>2.2.3.3	</a:t>
-            </a:r>
-            <a:r>
-              <a:rPr lang="en-US" dirty="0" smtClean="0"/>
-              <a:t>  ERROR </a:t>
-            </a:r>
-            <a:r>
-              <a:rPr lang="en-US" dirty="0"/>
-              <a:t>shall describe the most detailed debugging output for examination of software test failures.</a:t>
+              <a:t>2.2.3.3	  ERROR shall describe the most detailed debugging output for examination of software test failures.</a:t>
             </a:r>
           </a:p>
           <a:p>
@@ -6147,7 +6114,7 @@
           <p:cNvPr id="2" name="Title 1">
             <a:extLst>
               <a:ext uri="{FF2B5EF4-FFF2-40B4-BE49-F238E27FC236}">
-                <a16:creationId xmlns="" xmlns:a16="http://schemas.microsoft.com/office/drawing/2014/main" id="{3016A5BA-F72A-4CD9-AF4C-68ADAC202004}"/>
+                <a16:creationId xmlns:a16="http://schemas.microsoft.com/office/drawing/2014/main" id="{3016A5BA-F72A-4CD9-AF4C-68ADAC202004}"/>
               </a:ext>
             </a:extLst>
           </p:cNvPr>
@@ -6164,10 +6131,9 @@
           <a:lstStyle/>
           <a:p>
             <a:r>
-              <a:rPr lang="en-US" dirty="0" smtClean="0"/>
+              <a:rPr lang="en-US" dirty="0"/>
               <a:t>Requirements (User and System Level)</a:t>
             </a:r>
-            <a:endParaRPr lang="en-US" dirty="0"/>
           </a:p>
         </p:txBody>
       </p:sp>
@@ -6176,7 +6142,7 @@
           <p:cNvPr id="3" name="Content Placeholder 2">
             <a:extLst>
               <a:ext uri="{FF2B5EF4-FFF2-40B4-BE49-F238E27FC236}">
-                <a16:creationId xmlns="" xmlns:a16="http://schemas.microsoft.com/office/drawing/2014/main" id="{BAC61804-0702-4E9C-9632-1F546949E17F}"/>
+                <a16:creationId xmlns:a16="http://schemas.microsoft.com/office/drawing/2014/main" id="{BAC61804-0702-4E9C-9632-1F546949E17F}"/>
               </a:ext>
             </a:extLst>
           </p:cNvPr>
@@ -6200,29 +6166,17 @@
           <a:lstStyle/>
           <a:p>
             <a:r>
-              <a:rPr lang="en-US" dirty="0" smtClean="0"/>
-              <a:t>2.3  Users </a:t>
-            </a:r>
-            <a:r>
-              <a:rPr lang="en-US" dirty="0"/>
-              <a:t>shall have the ability to provide a test case where several tests are sent in quick succession to demonstrate the application executes tests concurrently</a:t>
-            </a:r>
-            <a:r>
-              <a:rPr lang="en-US" dirty="0" smtClean="0"/>
-              <a:t>.</a:t>
-            </a:r>
-          </a:p>
-          <a:p>
-            <a:endParaRPr lang="en-US" dirty="0" smtClean="0"/>
-          </a:p>
-          <a:p>
-            <a:r>
-              <a:rPr lang="en-US" dirty="0" smtClean="0"/>
-              <a:t>2.3.1</a:t>
-            </a:r>
-            <a:r>
-              <a:rPr lang="en-US" dirty="0"/>
-              <a:t>	The test case shall consist of several tests of varying duration that can run simultaneously. [0]</a:t>
+              <a:rPr lang="en-US" dirty="0"/>
+              <a:t>2.3  Users shall have the ability to provide a test case where several tests are sent in quick succession to demonstrate the application executes tests concurrently.</a:t>
+            </a:r>
+          </a:p>
+          <a:p>
+            <a:endParaRPr lang="en-US" dirty="0"/>
+          </a:p>
+          <a:p>
+            <a:r>
+              <a:rPr lang="en-US" dirty="0"/>
+              <a:t>2.3.1	The test case shall consist of several tests of varying duration that can run simultaneously. [0]</a:t>
             </a:r>
           </a:p>
           <a:p>
@@ -6240,34 +6194,22 @@
           <a:p>
             <a:pPr lvl="1"/>
             <a:r>
-              <a:rPr lang="en-US" dirty="0" smtClean="0"/>
-              <a:t>2.3.3.1 The </a:t>
-            </a:r>
-            <a:r>
-              <a:rPr lang="en-US" dirty="0"/>
-              <a:t>system shall allow specification of the thread pool size. [1]</a:t>
+              <a:rPr lang="en-US" dirty="0"/>
+              <a:t>2.3.3.1 The system shall allow specification of the thread pool size. [1]</a:t>
             </a:r>
           </a:p>
           <a:p>
             <a:pPr lvl="1"/>
             <a:r>
-              <a:rPr lang="en-US" dirty="0" smtClean="0"/>
-              <a:t>2.3.3.2 The </a:t>
-            </a:r>
-            <a:r>
-              <a:rPr lang="en-US" dirty="0"/>
-              <a:t>starting default minimum thread count shall be 5. [1]</a:t>
+              <a:rPr lang="en-US" dirty="0"/>
+              <a:t>2.3.3.2 The starting default minimum thread count shall be 5. [1]</a:t>
             </a:r>
           </a:p>
           <a:p>
             <a:pPr lvl="1"/>
             <a:r>
-              <a:rPr lang="en-US" dirty="0" smtClean="0"/>
-              <a:t>2.3.3.3 The </a:t>
-            </a:r>
-            <a:r>
-              <a:rPr lang="en-US" dirty="0"/>
-              <a:t>starting default maximum thread count shall be 15 (this keeps the application from spawning too many threads). [1]</a:t>
+              <a:rPr lang="en-US" dirty="0"/>
+              <a:t>2.3.3.3 The starting default maximum thread count shall be 15 (this keeps the application from spawning too many threads). [1]</a:t>
             </a:r>
           </a:p>
         </p:txBody>
@@ -6318,10 +6260,9 @@
           <a:lstStyle/>
           <a:p>
             <a:r>
-              <a:rPr lang="en-US" dirty="0" smtClean="0"/>
+              <a:rPr lang="en-US" dirty="0"/>
               <a:t>Requirements (User and System Level)</a:t>
             </a:r>
-            <a:endParaRPr lang="en-US" dirty="0"/>
           </a:p>
         </p:txBody>
       </p:sp>
@@ -6348,12 +6289,8 @@
           <a:lstStyle/>
           <a:p>
             <a:r>
-              <a:rPr lang="en-US" dirty="0" smtClean="0"/>
-              <a:t>2.4  The </a:t>
-            </a:r>
-            <a:r>
-              <a:rPr lang="en-US" dirty="0"/>
-              <a:t>test engine shall run on Windows platform and should run on Linux and Mac platforms. User access to the system shall be provided through a Web User Interface (</a:t>
+              <a:rPr lang="en-US" dirty="0"/>
+              <a:t>2.4  The test engine shall run on Windows platform and should run on Linux and Mac platforms. User access to the system shall be provided through a Web User Interface (</a:t>
             </a:r>
             <a:r>
               <a:rPr lang="en-US" dirty="0" err="1"/>
@@ -6371,19 +6308,15 @@
               <a:rPr lang="en-US" dirty="0"/>
               <a:t> shall support the Firefox web browser and should support Google Chrome and Microsoft Edge.</a:t>
             </a:r>
-            <a:endParaRPr lang="en-US" b="1" dirty="0" smtClean="0"/>
-          </a:p>
-          <a:p>
-            <a:endParaRPr lang="en-US" dirty="0" smtClean="0"/>
-          </a:p>
-          <a:p>
-            <a:r>
-              <a:rPr lang="en-US" dirty="0" smtClean="0"/>
-              <a:t>2.4.1</a:t>
-            </a:r>
-            <a:r>
-              <a:rPr lang="en-US" dirty="0"/>
-              <a:t>	The test engine shall be an application that can run on the Windows platform. [0]</a:t>
+            <a:endParaRPr lang="en-US" b="1" dirty="0"/>
+          </a:p>
+          <a:p>
+            <a:endParaRPr lang="en-US" dirty="0"/>
+          </a:p>
+          <a:p>
+            <a:r>
+              <a:rPr lang="en-US" dirty="0"/>
+              <a:t>2.4.1	The test engine shall be an application that can run on the Windows platform. [0]</a:t>
             </a:r>
           </a:p>
           <a:p>
@@ -6403,37 +6336,21 @@
             </a:r>
             <a:r>
               <a:rPr lang="en-US" dirty="0"/>
-              <a:t> to be accessed via a standard web </a:t>
-            </a:r>
-            <a:r>
-              <a:rPr lang="en-US" dirty="0" smtClean="0"/>
-              <a:t>browser</a:t>
-            </a:r>
-            <a:r>
-              <a:rPr lang="en-US" dirty="0"/>
-              <a:t>. [1]</a:t>
+              <a:t> to be accessed via a standard web browser. [1]</a:t>
             </a:r>
           </a:p>
           <a:p>
             <a:pPr lvl="1"/>
             <a:r>
-              <a:rPr lang="en-US" dirty="0" smtClean="0"/>
-              <a:t>2.4.3.1  The </a:t>
-            </a:r>
-            <a:r>
-              <a:rPr lang="en-US" dirty="0"/>
-              <a:t>system shall support the Firefox web browser. [1]</a:t>
+              <a:rPr lang="en-US" dirty="0"/>
+              <a:t>2.4.3.1  The system shall support the Firefox web browser. [1]</a:t>
             </a:r>
           </a:p>
           <a:p>
             <a:pPr lvl="1"/>
             <a:r>
-              <a:rPr lang="en-US" dirty="0" smtClean="0"/>
-              <a:t>2.4.3.2  The </a:t>
-            </a:r>
-            <a:r>
-              <a:rPr lang="en-US" dirty="0"/>
-              <a:t>system should support the Microsoft Edge and Google Chrome web browsers. [2]</a:t>
+              <a:rPr lang="en-US" dirty="0"/>
+              <a:t>2.4.3.2  The system should support the Microsoft Edge and Google Chrome web browsers. [2]</a:t>
             </a:r>
           </a:p>
           <a:p>
@@ -6487,10 +6404,9 @@
           <a:lstStyle/>
           <a:p>
             <a:r>
-              <a:rPr lang="en-US" dirty="0" smtClean="0"/>
+              <a:rPr lang="en-US" dirty="0"/>
               <a:t>Requirements (User and System Level)</a:t>
             </a:r>
-            <a:endParaRPr lang="en-US" dirty="0"/>
           </a:p>
         </p:txBody>
       </p:sp>
@@ -6517,16 +6433,16 @@
           <a:lstStyle/>
           <a:p>
             <a:r>
-              <a:rPr lang="en-US" smtClean="0"/>
+              <a:rPr lang="en-US"/>
               <a:t>2.5  The system shall handle application failures and errors as well as test failures and errors.</a:t>
             </a:r>
           </a:p>
           <a:p>
-            <a:endParaRPr lang="en-US" smtClean="0"/>
-          </a:p>
-          <a:p>
-            <a:r>
-              <a:rPr lang="en-US" smtClean="0"/>
+            <a:endParaRPr lang="en-US"/>
+          </a:p>
+          <a:p>
+            <a:r>
+              <a:rPr lang="en-US"/>
               <a:t>2.5.1	The system shall handle exceptions thrown by the application during testing with clear user 	output. [0]</a:t>
             </a:r>
           </a:p>
@@ -6581,10 +6497,9 @@
           <a:lstStyle/>
           <a:p>
             <a:r>
-              <a:rPr lang="en-US" dirty="0" smtClean="0"/>
+              <a:rPr lang="en-US" dirty="0"/>
               <a:t>Requirements (User and System Level)</a:t>
             </a:r>
-            <a:endParaRPr lang="en-US" dirty="0"/>
           </a:p>
         </p:txBody>
       </p:sp>
@@ -6611,16 +6526,8 @@
           <a:lstStyle/>
           <a:p>
             <a:r>
-              <a:rPr lang="en-US" dirty="0" smtClean="0"/>
-              <a:t>2.6  The </a:t>
-            </a:r>
-            <a:r>
-              <a:rPr lang="en-US" dirty="0"/>
-              <a:t>system shall be user friendly, have a graphic user interface, and use a web-enabled client (browser). The system shall be installable locally on the user’s machine and use its own desktop interface</a:t>
-            </a:r>
-            <a:r>
-              <a:rPr lang="en-US" dirty="0" smtClean="0"/>
-              <a:t>.</a:t>
+              <a:rPr lang="en-US" dirty="0"/>
+              <a:t>2.6  The system shall be user friendly, have a graphic user interface, and use a web-enabled client (browser). The system shall be installable locally on the user’s machine and use its own desktop interface.</a:t>
             </a:r>
           </a:p>
           <a:p>
@@ -6669,64 +6576,36 @@
           <a:p>
             <a:pPr lvl="1"/>
             <a:r>
-              <a:rPr lang="en-US" dirty="0" smtClean="0"/>
-              <a:t>2.6.4.1  Display </a:t>
-            </a:r>
-            <a:r>
-              <a:rPr lang="en-US" dirty="0"/>
-              <a:t>all possible tests and allow the user to select all tests they wish to run. </a:t>
-            </a:r>
-            <a:r>
-              <a:rPr lang="en-US" dirty="0" smtClean="0"/>
-              <a:t>[</a:t>
-            </a:r>
-            <a:r>
-              <a:rPr lang="en-US" dirty="0"/>
-              <a:t>0]</a:t>
+              <a:rPr lang="en-US" dirty="0"/>
+              <a:t>2.6.4.1  Display all possible tests and allow the user to select all tests they wish to run. [0]</a:t>
             </a:r>
           </a:p>
           <a:p>
             <a:pPr lvl="1"/>
             <a:r>
-              <a:rPr lang="en-US" dirty="0" smtClean="0"/>
-              <a:t>2.6.4.2  Display </a:t>
-            </a:r>
-            <a:r>
-              <a:rPr lang="en-US" dirty="0"/>
-              <a:t>the selected list of all tests to be run (container object on GUI). [0]</a:t>
+              <a:rPr lang="en-US" dirty="0"/>
+              <a:t>2.6.4.2  Display the selected list of all tests to be run (container object on GUI). [0]</a:t>
             </a:r>
           </a:p>
           <a:p>
             <a:pPr lvl="1"/>
             <a:r>
-              <a:rPr lang="en-US" dirty="0" smtClean="0"/>
-              <a:t>2.6.4.3  Show </a:t>
-            </a:r>
-            <a:r>
-              <a:rPr lang="en-US" dirty="0"/>
-              <a:t>test progress and status on the GUI. [0]</a:t>
+              <a:rPr lang="en-US" dirty="0"/>
+              <a:t>2.6.4.3  Show test progress and status on the GUI. [0]</a:t>
             </a:r>
           </a:p>
           <a:p>
             <a:pPr lvl="1"/>
             <a:r>
-              <a:rPr lang="en-US" dirty="0" smtClean="0"/>
-              <a:t>2.6.4.4  Display </a:t>
-            </a:r>
-            <a:r>
-              <a:rPr lang="en-US" dirty="0"/>
-              <a:t>the results of each test in real-time. [1]</a:t>
+              <a:rPr lang="en-US" dirty="0"/>
+              <a:t>2.6.4.4  Display the results of each test in real-time. [1]</a:t>
             </a:r>
           </a:p>
           <a:p>
             <a:pPr lvl="1"/>
             <a:r>
-              <a:rPr lang="en-US" dirty="0" smtClean="0"/>
-              <a:t>2.6.4.5  Allow </a:t>
-            </a:r>
-            <a:r>
-              <a:rPr lang="en-US" dirty="0"/>
-              <a:t>the user to specify an output file in which to log the test results. [1]</a:t>
+              <a:rPr lang="en-US" dirty="0"/>
+              <a:t>2.6.4.5  Allow the user to specify an output file in which to log the test results. [1]</a:t>
             </a:r>
           </a:p>
         </p:txBody>
@@ -6782,25 +6661,16 @@
           <a:lstStyle/>
           <a:p>
             <a:r>
-              <a:rPr lang="en-US" dirty="0" smtClean="0"/>
-              <a:t>Requirements </a:t>
-            </a:r>
-            <a:r>
-              <a:rPr lang="en-US" dirty="0"/>
-              <a:t>(User and System Level</a:t>
-            </a:r>
-            <a:r>
-              <a:rPr lang="en-US" dirty="0" smtClean="0"/>
-              <a:t>)</a:t>
+              <a:rPr lang="en-US" dirty="0"/>
+              <a:t>Requirements (User and System Level)</a:t>
             </a:r>
             <a:br>
-              <a:rPr lang="en-US" dirty="0" smtClean="0"/>
+              <a:rPr lang="en-US" dirty="0"/>
             </a:br>
             <a:r>
-              <a:rPr lang="en-US" dirty="0" smtClean="0"/>
+              <a:rPr lang="en-US" dirty="0"/>
               <a:t>2.6 Continued</a:t>
             </a:r>
-            <a:endParaRPr lang="en-US" dirty="0"/>
           </a:p>
         </p:txBody>
       </p:sp>
@@ -6837,86 +6707,50 @@
           <a:p>
             <a:pPr lvl="1"/>
             <a:r>
-              <a:rPr lang="en-US" dirty="0" smtClean="0"/>
-              <a:t>2.6.5.1  Display </a:t>
-            </a:r>
-            <a:r>
-              <a:rPr lang="en-US" dirty="0"/>
-              <a:t>all possible tests and allow the user to select all tests they wish to run. </a:t>
-            </a:r>
-            <a:r>
-              <a:rPr lang="en-US" dirty="0" smtClean="0"/>
-              <a:t>[</a:t>
-            </a:r>
-            <a:r>
-              <a:rPr lang="en-US" dirty="0"/>
-              <a:t>1]</a:t>
+              <a:rPr lang="en-US" dirty="0"/>
+              <a:t>2.6.5.1  Display all possible tests and allow the user to select all tests they wish to run. [1]</a:t>
             </a:r>
           </a:p>
           <a:p>
             <a:pPr lvl="1"/>
             <a:r>
-              <a:rPr lang="en-US" dirty="0" smtClean="0"/>
-              <a:t>2.6.5.2  Display </a:t>
-            </a:r>
-            <a:r>
-              <a:rPr lang="en-US" dirty="0"/>
-              <a:t>the selected list of all tests to be run (container object on GUI). [1]</a:t>
+              <a:rPr lang="en-US" dirty="0"/>
+              <a:t>2.6.5.2  Display the selected list of all tests to be run (container object on GUI). [1]</a:t>
             </a:r>
           </a:p>
           <a:p>
             <a:pPr lvl="1"/>
             <a:r>
-              <a:rPr lang="en-US" dirty="0" smtClean="0"/>
-              <a:t>2.6.5.3  Show </a:t>
-            </a:r>
-            <a:r>
-              <a:rPr lang="en-US" dirty="0"/>
-              <a:t>test progress and status on the GUI. [1]</a:t>
+              <a:rPr lang="en-US" dirty="0"/>
+              <a:t>2.6.5.3  Show test progress and status on the GUI. [1]</a:t>
             </a:r>
           </a:p>
           <a:p>
             <a:pPr lvl="1"/>
             <a:r>
-              <a:rPr lang="en-US" dirty="0" smtClean="0"/>
-              <a:t>2.6.5.4  Display </a:t>
-            </a:r>
-            <a:r>
-              <a:rPr lang="en-US" dirty="0"/>
-              <a:t>the results of each test in real-time. [2]</a:t>
+              <a:rPr lang="en-US" dirty="0"/>
+              <a:t>2.6.5.4  Display the results of each test in real-time. [2]</a:t>
             </a:r>
           </a:p>
           <a:p>
             <a:pPr lvl="1"/>
             <a:r>
-              <a:rPr lang="en-US" dirty="0" smtClean="0"/>
-              <a:t>2.6.5.5  Allow </a:t>
-            </a:r>
-            <a:r>
-              <a:rPr lang="en-US" dirty="0"/>
-              <a:t>the user to specify an output file in which to log the test results. [2]</a:t>
+              <a:rPr lang="en-US" dirty="0"/>
+              <a:t>2.6.5.5  Allow the user to specify an output file in which to log the test results. [2]</a:t>
             </a:r>
           </a:p>
           <a:p>
             <a:pPr lvl="1"/>
             <a:r>
-              <a:rPr lang="en-US" dirty="0" smtClean="0"/>
-              <a:t>2.6.5.6  </a:t>
-            </a:r>
-            <a:r>
-              <a:rPr lang="en-US" dirty="0"/>
-              <a:t>Execute tests on available clients. [1]</a:t>
+              <a:rPr lang="en-US" dirty="0"/>
+              <a:t>2.6.5.6  Execute tests on available clients. [1]</a:t>
             </a:r>
           </a:p>
           <a:p>
             <a:pPr lvl="1"/>
             <a:r>
-              <a:rPr lang="en-US" dirty="0" smtClean="0"/>
-              <a:t>2.6.5.7  </a:t>
-            </a:r>
-            <a:r>
-              <a:rPr lang="en-US" dirty="0"/>
-              <a:t>Export current and prior test results for specific clients. [2]</a:t>
+              <a:rPr lang="en-US" dirty="0"/>
+              <a:t>2.6.5.7  Export current and prior test results for specific clients. [2]</a:t>
             </a:r>
           </a:p>
           <a:p>
@@ -6970,10 +6804,9 @@
           <a:lstStyle/>
           <a:p>
             <a:r>
-              <a:rPr lang="en-US" dirty="0" smtClean="0"/>
+              <a:rPr lang="en-US" dirty="0"/>
               <a:t>Requirements (User and System Level)</a:t>
             </a:r>
-            <a:endParaRPr lang="en-US" dirty="0"/>
           </a:p>
         </p:txBody>
       </p:sp>
@@ -7000,12 +6833,8 @@
           <a:lstStyle/>
           <a:p>
             <a:r>
-              <a:rPr lang="en-US" dirty="0" smtClean="0"/>
-              <a:t>2.7  The </a:t>
-            </a:r>
-            <a:r>
-              <a:rPr lang="en-US" dirty="0"/>
-              <a:t>user shall log into the system via the </a:t>
+              <a:rPr lang="en-US" dirty="0"/>
+              <a:t>2.7  The user shall log into the system via the </a:t>
             </a:r>
             <a:r>
               <a:rPr lang="en-US" dirty="0" err="1"/>
@@ -7013,11 +6842,7 @@
             </a:r>
             <a:r>
               <a:rPr lang="en-US" dirty="0"/>
-              <a:t> and the system will authenticate the user.  Once logged into the system and user role determination has been made, the user can register/de-register his/her machine with the Test Server</a:t>
-            </a:r>
-            <a:r>
-              <a:rPr lang="en-US" dirty="0" smtClean="0"/>
-              <a:t>.</a:t>
+              <a:t> and the system will authenticate the user.  Once logged into the system and user role determination has been made, the user can register/de-register his/her machine with the Test Server.</a:t>
             </a:r>
           </a:p>
           <a:p>
@@ -7049,7 +6874,6 @@
               <a:rPr lang="en-US" dirty="0"/>
               <a:t>2.7.4	The user shall have the ability to de-register their local test engine with the test server. [1]</a:t>
             </a:r>
-            <a:endParaRPr lang="en-US" dirty="0"/>
           </a:p>
         </p:txBody>
       </p:sp>
@@ -7099,10 +6923,9 @@
           <a:lstStyle/>
           <a:p>
             <a:r>
-              <a:rPr lang="en-US" dirty="0" smtClean="0"/>
+              <a:rPr lang="en-US" dirty="0"/>
               <a:t>Requirements (User and System Level)</a:t>
             </a:r>
-            <a:endParaRPr lang="en-US" dirty="0"/>
           </a:p>
         </p:txBody>
       </p:sp>
@@ -7129,20 +6952,8 @@
           <a:lstStyle/>
           <a:p>
             <a:r>
-              <a:rPr lang="en-US" dirty="0" smtClean="0"/>
-              <a:t>2.8  </a:t>
-            </a:r>
-            <a:r>
-              <a:rPr lang="en-US" dirty="0" smtClean="0"/>
-              <a:t>The </a:t>
-            </a:r>
-            <a:r>
-              <a:rPr lang="en-US" dirty="0"/>
-              <a:t>system shall be highly available and disaster recoverable. The system will have a production environment that is usable by multiple users implemented in multiple regions and availability zones in the cloud. [2</a:t>
-            </a:r>
-            <a:r>
-              <a:rPr lang="en-US" dirty="0" smtClean="0"/>
-              <a:t>]</a:t>
+              <a:rPr lang="en-US" dirty="0"/>
+              <a:t>2.8  The system shall be highly available and disaster recoverable. The system will have a production environment that is usable by multiple users implemented in multiple regions and availability zones in the cloud. [2]</a:t>
             </a:r>
           </a:p>
           <a:p>
@@ -7153,90 +6964,38 @@
           </a:p>
           <a:p>
             <a:r>
-              <a:rPr lang="en-US" dirty="0" smtClean="0"/>
-              <a:t>2.8.1</a:t>
-            </a:r>
-            <a:r>
-              <a:rPr lang="en-US" dirty="0"/>
-              <a:t>	The user shall have the ability to install the test engine on multiple machines (redundancy, performance, latency). [0]</a:t>
-            </a:r>
-          </a:p>
-          <a:p>
-            <a:r>
-              <a:rPr lang="en-US" dirty="0" smtClean="0"/>
-              <a:t>2.8.2   </a:t>
-            </a:r>
-            <a:r>
-              <a:rPr lang="en-US" dirty="0" smtClean="0"/>
-              <a:t>The </a:t>
-            </a:r>
-            <a:r>
-              <a:rPr lang="en-US" dirty="0"/>
-              <a:t>system shall maintain all program code in scripts that can be deployed to the cloud platform. 	System source code and data shall be stored in a fault-tolerant, distributed file system such as 	Amazon S3 or HDFS where it can be accessible and deployed to support disaster recovery and 	availability requirements. [2]</a:t>
-            </a:r>
-          </a:p>
-          <a:p>
-            <a:r>
-              <a:rPr lang="en-US" dirty="0" smtClean="0"/>
-              <a:t>2.8.3   </a:t>
-            </a:r>
-            <a:r>
-              <a:rPr lang="en-US" dirty="0" smtClean="0"/>
-              <a:t>Backup </a:t>
-            </a:r>
-            <a:r>
-              <a:rPr lang="en-US" dirty="0"/>
-              <a:t>copies of all scripts shall be located in a separate region. [2]</a:t>
-            </a:r>
-          </a:p>
-          <a:p>
-            <a:r>
-              <a:rPr lang="en-US" dirty="0" smtClean="0"/>
-              <a:t>2.8.4   </a:t>
-            </a:r>
-            <a:r>
-              <a:rPr lang="en-US" dirty="0" smtClean="0"/>
-              <a:t>System </a:t>
-            </a:r>
-            <a:r>
-              <a:rPr lang="en-US" dirty="0"/>
-              <a:t>source code shall be deployed to cloud instances hosted in several regions and availability zones. [2]</a:t>
-            </a:r>
-          </a:p>
-          <a:p>
-            <a:r>
-              <a:rPr lang="en-US" dirty="0" smtClean="0"/>
-              <a:t>2.8.5</a:t>
-            </a:r>
-            <a:r>
-              <a:rPr lang="en-US" dirty="0"/>
-              <a:t>	</a:t>
-            </a:r>
-            <a:r>
-              <a:rPr lang="en-US" dirty="0" smtClean="0"/>
-              <a:t> Access </a:t>
-            </a:r>
-            <a:r>
-              <a:rPr lang="en-US" dirty="0"/>
-              <a:t>to the system shall be controlled using defined, cloud managed IAM roles, which will allow for configurable levels of access to and control over the system and its resources. [1]</a:t>
-            </a:r>
-          </a:p>
-          <a:p>
-            <a:r>
-              <a:rPr lang="en-US" dirty="0" smtClean="0"/>
-              <a:t>2.8.6</a:t>
-            </a:r>
-            <a:r>
-              <a:rPr lang="en-US" dirty="0"/>
-              <a:t>	</a:t>
-            </a:r>
-            <a:r>
-              <a:rPr lang="en-US" dirty="0" smtClean="0"/>
-              <a:t> The </a:t>
-            </a:r>
-            <a:r>
-              <a:rPr lang="en-US" dirty="0"/>
-              <a:t>test environment shall be implemented in multiple zones and multiple regions to enable testing of HA/DR requirements rather than taking production down. [3]</a:t>
+              <a:rPr lang="en-US" dirty="0"/>
+              <a:t>2.8.1	The user shall have the ability to install the test engine on multiple machines (redundancy, performance, latency). [0]</a:t>
+            </a:r>
+          </a:p>
+          <a:p>
+            <a:r>
+              <a:rPr lang="en-US" dirty="0"/>
+              <a:t>2.8.2   The system shall maintain all program code in scripts that can be deployed to the cloud platform. 	System source code and data shall be stored in a fault-tolerant, distributed file system such as 	Amazon S3 or HDFS where it can be accessible and deployed to support disaster recovery and 	availability requirements. [2]</a:t>
+            </a:r>
+          </a:p>
+          <a:p>
+            <a:r>
+              <a:rPr lang="en-US" dirty="0"/>
+              <a:t>2.8.3   Backup copies of all scripts shall be located in a separate region. [2]</a:t>
+            </a:r>
+          </a:p>
+          <a:p>
+            <a:r>
+              <a:rPr lang="en-US" dirty="0"/>
+              <a:t>2.8.4   System source code shall be deployed to cloud instances hosted in several regions and availability zones. [2]</a:t>
+            </a:r>
+          </a:p>
+          <a:p>
+            <a:r>
+              <a:rPr lang="en-US" dirty="0"/>
+              <a:t>2.8.5	 Access to the system shall be controlled using defined, cloud managed IAM roles, which will allow for configurable levels of access to and control over the system and its resources. [1]</a:t>
+            </a:r>
+          </a:p>
+          <a:p>
+            <a:r>
+              <a:rPr lang="en-US" dirty="0"/>
+              <a:t>2.8.6	 The test environment shall be implemented in multiple zones and multiple regions to enable testing of HA/DR requirements rather than taking production down. [3]</a:t>
             </a:r>
           </a:p>
         </p:txBody>
@@ -7430,32 +7189,20 @@
           <a:lstStyle/>
           <a:p>
             <a:r>
-              <a:rPr lang="en-US" sz="2000" dirty="0" smtClean="0"/>
-              <a:t>4.1.1</a:t>
-            </a:r>
-            <a:r>
               <a:rPr lang="en-US" sz="2000" dirty="0"/>
-              <a:t>	The system shall be developed using the C++ programming language and the C++ Standard Template Library (STL). [0]</a:t>
-            </a:r>
-          </a:p>
-          <a:p>
-            <a:r>
-              <a:rPr lang="en-US" sz="2000" dirty="0" smtClean="0"/>
-              <a:t>4.1.2</a:t>
-            </a:r>
+              <a:t>4.1.1	The system shall be developed using the C++ programming language and the C++ Standard Template Library (STL). [0]</a:t>
+            </a:r>
+          </a:p>
+          <a:p>
             <a:r>
               <a:rPr lang="en-US" sz="2000" dirty="0"/>
-              <a:t>	The system shall be developed using a publicly available source code editor which supports the C++ language. [0]</a:t>
-            </a:r>
-          </a:p>
-          <a:p>
-            <a:r>
-              <a:rPr lang="en-US" sz="2000" dirty="0" smtClean="0"/>
-              <a:t>4.1.3    </a:t>
-            </a:r>
+              <a:t>4.1.2	The system shall be developed using a publicly available source code editor which supports the C++ language. [0]</a:t>
+            </a:r>
+          </a:p>
+          <a:p>
             <a:r>
               <a:rPr lang="en-US" sz="2000" dirty="0"/>
-              <a:t>The system shall have at least 75% unit test coverage of the source code. [1]</a:t>
+              <a:t>4.1.3    The system shall have at least 75% unit test coverage of the source code. [1]</a:t>
             </a:r>
           </a:p>
         </p:txBody>
@@ -7646,22 +7393,14 @@
           <a:lstStyle/>
           <a:p>
             <a:r>
-              <a:rPr lang="en-US" sz="2000" dirty="0" smtClean="0"/>
-              <a:t>4.2.1     </a:t>
-            </a:r>
-            <a:r>
               <a:rPr lang="en-US" sz="2000" dirty="0"/>
-              <a:t>Granting access to a new user of the system shall take no more than 1 business day to complete. [0]</a:t>
-            </a:r>
-          </a:p>
-          <a:p>
-            <a:r>
-              <a:rPr lang="en-US" sz="2000" dirty="0" smtClean="0"/>
-              <a:t>4.2.2     </a:t>
-            </a:r>
+              <a:t>4.2.1     Granting access to a new user of the system shall take no more than 1 business day to complete. [0]</a:t>
+            </a:r>
+          </a:p>
+          <a:p>
             <a:r>
               <a:rPr lang="en-US" sz="2000" dirty="0"/>
-              <a:t>Modifying or removing a user’s access to the system shall take no more than 1 business day to complete. [0]</a:t>
+              <a:t>4.2.2     Modifying or removing a user’s access to the system shall take no more than 1 business day to complete. [0]</a:t>
             </a:r>
           </a:p>
         </p:txBody>
@@ -7739,22 +7478,14 @@
           <a:lstStyle/>
           <a:p>
             <a:r>
-              <a:rPr lang="en-US" sz="2000" dirty="0" smtClean="0"/>
-              <a:t>4.3.1</a:t>
-            </a:r>
-            <a:r>
               <a:rPr lang="en-US" sz="2000" dirty="0"/>
-              <a:t>	Disaster recovery shall be cost-effective and managed through the fault tolerance and high availability features of the cloud-based system architecture. [1]</a:t>
-            </a:r>
-          </a:p>
-          <a:p>
-            <a:r>
-              <a:rPr lang="en-US" sz="2000" dirty="0" smtClean="0"/>
-              <a:t>4.3.2      </a:t>
-            </a:r>
+              <a:t>4.3.1	Disaster recovery shall be cost-effective and managed through the fault tolerance and high availability features of the cloud-based system architecture. [1]</a:t>
+            </a:r>
+          </a:p>
+          <a:p>
             <a:r>
               <a:rPr lang="en-US" sz="2000" dirty="0"/>
-              <a:t>User training shall take no more than 1 business day to complete, regardless of the user’s role. [2]</a:t>
+              <a:t>4.3.2      User training shall take no more than 1 business day to complete, regardless of the user’s role. [2]</a:t>
             </a:r>
           </a:p>
           <a:p>
@@ -7819,7 +7550,7 @@
           <p:cNvPr id="4" name="Picture 3">
             <a:extLst>
               <a:ext uri="{FF2B5EF4-FFF2-40B4-BE49-F238E27FC236}">
-                <a16:creationId xmlns="" xmlns:a16="http://schemas.microsoft.com/office/drawing/2014/main" id="{FA00AEF5-55CF-4716-B10D-11660D42C9F5}"/>
+                <a16:creationId xmlns:a16="http://schemas.microsoft.com/office/drawing/2014/main" id="{FA00AEF5-55CF-4716-B10D-11660D42C9F5}"/>
               </a:ext>
             </a:extLst>
           </p:cNvPr>
@@ -7849,7 +7580,7 @@
           <p:cNvPr id="6" name="Picture 5">
             <a:extLst>
               <a:ext uri="{FF2B5EF4-FFF2-40B4-BE49-F238E27FC236}">
-                <a16:creationId xmlns="" xmlns:a16="http://schemas.microsoft.com/office/drawing/2014/main" id="{2CE94564-7E21-42B5-B0C3-7B175B692FB4}"/>
+                <a16:creationId xmlns:a16="http://schemas.microsoft.com/office/drawing/2014/main" id="{2CE94564-7E21-42B5-B0C3-7B175B692FB4}"/>
               </a:ext>
             </a:extLst>
           </p:cNvPr>
@@ -7879,7 +7610,7 @@
           <p:cNvPr id="8" name="Picture 7">
             <a:extLst>
               <a:ext uri="{FF2B5EF4-FFF2-40B4-BE49-F238E27FC236}">
-                <a16:creationId xmlns="" xmlns:a16="http://schemas.microsoft.com/office/drawing/2014/main" id="{9A5C1814-5B60-480F-9900-D25FA371C13D}"/>
+                <a16:creationId xmlns:a16="http://schemas.microsoft.com/office/drawing/2014/main" id="{9A5C1814-5B60-480F-9900-D25FA371C13D}"/>
               </a:ext>
             </a:extLst>
           </p:cNvPr>
@@ -7961,7 +7692,7 @@
           <p:cNvPr id="5" name="Picture 4">
             <a:extLst>
               <a:ext uri="{FF2B5EF4-FFF2-40B4-BE49-F238E27FC236}">
-                <a16:creationId xmlns="" xmlns:a16="http://schemas.microsoft.com/office/drawing/2014/main" id="{13B04C9D-E45A-4DE2-AF80-B1367C691FAE}"/>
+                <a16:creationId xmlns:a16="http://schemas.microsoft.com/office/drawing/2014/main" id="{13B04C9D-E45A-4DE2-AF80-B1367C691FAE}"/>
               </a:ext>
             </a:extLst>
           </p:cNvPr>
@@ -8040,10 +7771,10 @@
       </p:sp>
       <p:pic>
         <p:nvPicPr>
-          <p:cNvPr id="9" name="Picture 8">
+          <p:cNvPr id="5" name="Picture 4">
             <a:extLst>
               <a:ext uri="{FF2B5EF4-FFF2-40B4-BE49-F238E27FC236}">
-                <a16:creationId xmlns="" xmlns:a16="http://schemas.microsoft.com/office/drawing/2014/main" id="{B50AD3E8-FD4C-4543-9C8F-D6BCED40866F}"/>
+                <a16:creationId xmlns:a16="http://schemas.microsoft.com/office/drawing/2014/main" id="{FB298827-6BC9-41F1-BAFC-D3F294B5FBED}"/>
               </a:ext>
             </a:extLst>
           </p:cNvPr>
@@ -8060,38 +7791,8 @@
         </p:blipFill>
         <p:spPr>
           <a:xfrm>
-            <a:off x="888886" y="1422398"/>
-            <a:ext cx="6076894" cy="5036705"/>
-          </a:xfrm>
-          <a:prstGeom prst="rect">
-            <a:avLst/>
-          </a:prstGeom>
-        </p:spPr>
-      </p:pic>
-      <p:pic>
-        <p:nvPicPr>
-          <p:cNvPr id="4" name="Picture 3">
-            <a:extLst>
-              <a:ext uri="{FF2B5EF4-FFF2-40B4-BE49-F238E27FC236}">
-                <a16:creationId xmlns="" xmlns:a16="http://schemas.microsoft.com/office/drawing/2014/main" id="{79E925FD-1F10-4036-9F0A-7FC0A5C14A78}"/>
-              </a:ext>
-            </a:extLst>
-          </p:cNvPr>
-          <p:cNvPicPr>
-            <a:picLocks noChangeAspect="1"/>
-          </p:cNvPicPr>
-          <p:nvPr/>
-        </p:nvPicPr>
-        <p:blipFill>
-          <a:blip r:embed="rId3"/>
-          <a:stretch>
-            <a:fillRect/>
-          </a:stretch>
-        </p:blipFill>
-        <p:spPr>
-          <a:xfrm>
-            <a:off x="6499020" y="1485903"/>
-            <a:ext cx="2385335" cy="3441698"/>
+            <a:off x="850108" y="1288474"/>
+            <a:ext cx="7587309" cy="5373417"/>
           </a:xfrm>
           <a:prstGeom prst="rect">
             <a:avLst/>
@@ -8650,7 +8351,7 @@
           <p:cNvPr id="6" name="Picture 5">
             <a:extLst>
               <a:ext uri="{FF2B5EF4-FFF2-40B4-BE49-F238E27FC236}">
-                <a16:creationId xmlns="" xmlns:a16="http://schemas.microsoft.com/office/drawing/2014/main" id="{42F62902-0B99-45F6-8313-405C7CFCB586}"/>
+                <a16:creationId xmlns:a16="http://schemas.microsoft.com/office/drawing/2014/main" id="{42F62902-0B99-45F6-8313-405C7CFCB586}"/>
               </a:ext>
             </a:extLst>
           </p:cNvPr>
@@ -9279,10 +8980,9 @@
           <a:lstStyle/>
           <a:p>
             <a:r>
-              <a:rPr lang="en-US" dirty="0" smtClean="0"/>
+              <a:rPr lang="en-US" dirty="0"/>
               <a:t>Requirements (User and System Level)</a:t>
             </a:r>
-            <a:endParaRPr lang="en-US" dirty="0"/>
           </a:p>
         </p:txBody>
       </p:sp>
@@ -9309,56 +9009,23 @@
           <a:lstStyle/>
           <a:p>
             <a:r>
-              <a:rPr lang="en-US" dirty="0" smtClean="0"/>
-              <a:t>2.1  The </a:t>
-            </a:r>
-            <a:r>
-              <a:rPr lang="en-US" dirty="0"/>
-              <a:t>users of this Test Framework system shall have the ability to setup and run individual unit tests of program code, hardware, and infrastructure, as well as run multiple tests simultaneously. They need to be able to stress performance, ensure scalability, and diagnose system interface issues.  Test results shall be saved for future recall, and configuration of the system maintained and stored</a:t>
-            </a:r>
-            <a:r>
-              <a:rPr lang="en-US" dirty="0" smtClean="0"/>
-              <a:t>.</a:t>
-            </a:r>
-          </a:p>
-          <a:p>
-            <a:endParaRPr lang="en-US" dirty="0" smtClean="0"/>
-          </a:p>
-          <a:p>
-            <a:r>
-              <a:rPr lang="en-US" dirty="0" smtClean="0"/>
-              <a:t>2.1.1 	The </a:t>
-            </a:r>
-            <a:r>
-              <a:rPr lang="en-US" dirty="0"/>
-              <a:t>test engine shall not require changing and recompiling the program each time a test is run. </a:t>
-            </a:r>
-            <a:r>
-              <a:rPr lang="en-US" dirty="0" smtClean="0"/>
-              <a:t>[</a:t>
-            </a:r>
-            <a:r>
-              <a:rPr lang="en-US" dirty="0"/>
-              <a:t>0]</a:t>
-            </a:r>
-            <a:endParaRPr lang="en-US" dirty="0" smtClean="0"/>
-          </a:p>
-          <a:p>
-            <a:r>
-              <a:rPr lang="en-US" dirty="0" smtClean="0"/>
-              <a:t>2.1.2</a:t>
-            </a:r>
-            <a:r>
-              <a:rPr lang="en-US" dirty="0"/>
-              <a:t>	</a:t>
-            </a:r>
-            <a:r>
-              <a:rPr lang="en-US" dirty="0" smtClean="0"/>
-              <a:t>The </a:t>
-            </a:r>
-            <a:r>
-              <a:rPr lang="en-US" dirty="0"/>
-              <a:t>system shall be implemented as a client-server system wherein the Web User Interface (</a:t>
+              <a:rPr lang="en-US" dirty="0"/>
+              <a:t>2.1  The users of this Test Framework system shall have the ability to setup and run individual unit tests of program code, hardware, and infrastructure, as well as run multiple tests simultaneously. They need to be able to stress performance, ensure scalability, and diagnose system interface issues.  Test results shall be saved for future recall, and configuration of the system maintained and stored.</a:t>
+            </a:r>
+          </a:p>
+          <a:p>
+            <a:endParaRPr lang="en-US" dirty="0"/>
+          </a:p>
+          <a:p>
+            <a:r>
+              <a:rPr lang="en-US" dirty="0"/>
+              <a:t>2.1.1 	The test engine shall not require changing and recompiling the program each time a test is run. [0]</a:t>
+            </a:r>
+          </a:p>
+          <a:p>
+            <a:r>
+              <a:rPr lang="en-US" dirty="0"/>
+              <a:t>2.1.2	The system shall be implemented as a client-server system wherein the Web User Interface (</a:t>
             </a:r>
             <a:r>
               <a:rPr lang="en-US" dirty="0" err="1"/>
@@ -9371,30 +9038,14 @@
           </a:p>
           <a:p>
             <a:r>
-              <a:rPr lang="en-US" dirty="0" smtClean="0"/>
-              <a:t>2.1.3</a:t>
-            </a:r>
-            <a:r>
-              <a:rPr lang="en-US" dirty="0"/>
-              <a:t>	</a:t>
-            </a:r>
-            <a:r>
-              <a:rPr lang="en-US" dirty="0" smtClean="0"/>
-              <a:t>The </a:t>
-            </a:r>
-            <a:r>
-              <a:rPr lang="en-US" dirty="0"/>
-              <a:t>system shall employ a database in which to store all test data, including configuration data, 	test cases, and test results. [1]</a:t>
-            </a:r>
-          </a:p>
-          <a:p>
-            <a:r>
-              <a:rPr lang="en-US" dirty="0" smtClean="0"/>
-              <a:t>2.2.4</a:t>
-            </a:r>
-            <a:r>
-              <a:rPr lang="en-US" dirty="0"/>
-              <a:t>	The system shall employ a test server, which will provide the business logic and serve as the API between the database and the </a:t>
+              <a:rPr lang="en-US" dirty="0"/>
+              <a:t>2.1.3	The system shall employ a database in which to store all test data, including configuration data, 	test cases, and test results. [1]</a:t>
+            </a:r>
+          </a:p>
+          <a:p>
+            <a:r>
+              <a:rPr lang="en-US" dirty="0"/>
+              <a:t>2.2.4	The system shall employ a test server, which will provide the business logic and serve as the API between the database and the </a:t>
             </a:r>
             <a:r>
               <a:rPr lang="en-US" dirty="0" err="1"/>
@@ -9407,22 +9058,14 @@
           </a:p>
           <a:p>
             <a:r>
-              <a:rPr lang="en-US" dirty="0" smtClean="0"/>
-              <a:t>2.1.5</a:t>
-            </a:r>
-            <a:r>
-              <a:rPr lang="en-US" dirty="0"/>
-              <a:t>	The system shall be hosted on a cloud platform to support ease of resource acquisition and hosting, automatic scaling of system resources, built-in network infrastructure, managed services	where needed. [2]</a:t>
-            </a:r>
-          </a:p>
-          <a:p>
-            <a:r>
-              <a:rPr lang="en-US" dirty="0" smtClean="0"/>
-              <a:t>2.1.6</a:t>
-            </a:r>
-            <a:r>
-              <a:rPr lang="en-US" dirty="0"/>
-              <a:t>	The system shall allow the ability to create additional environments for specialized testing upon demand. [2]</a:t>
+              <a:rPr lang="en-US" dirty="0"/>
+              <a:t>2.1.5	The system shall be hosted on a cloud platform to support ease of resource acquisition and hosting, automatic scaling of system resources, built-in network infrastructure, managed services	where needed. [2]</a:t>
+            </a:r>
+          </a:p>
+          <a:p>
+            <a:r>
+              <a:rPr lang="en-US" dirty="0"/>
+              <a:t>2.1.6	The system shall allow the ability to create additional environments for specialized testing upon demand. [2]</a:t>
             </a:r>
           </a:p>
           <a:p>

</xml_diff>